<commit_message>
Added additional questions and fleshed out information in WDS
</commit_message>
<xml_diff>
--- a/Whiteboard design session/media/diagrams.pptx
+++ b/Whiteboard design session/media/diagrams.pptx
@@ -200,7 +200,7 @@
           <a:p>
             <a:fld id="{90D82B7B-9A37-0949-A600-BA30C7EE531A}" type="datetimeFigureOut">
               <a:rPr lang="en-US" smtClean="0"/>
-              <a:t>6/22/2019</a:t>
+              <a:t>6/23/2019</a:t>
             </a:fld>
             <a:endParaRPr lang="en-US"/>
           </a:p>
@@ -872,7 +872,7 @@
           <a:p>
             <a:fld id="{232015E6-04D3-AA46-8EB6-5FC99D770932}" type="datetimeFigureOut">
               <a:rPr lang="en-US" smtClean="0"/>
-              <a:t>6/22/2019</a:t>
+              <a:t>6/23/2019</a:t>
             </a:fld>
             <a:endParaRPr lang="en-US"/>
           </a:p>
@@ -1040,7 +1040,7 @@
           <a:p>
             <a:fld id="{232015E6-04D3-AA46-8EB6-5FC99D770932}" type="datetimeFigureOut">
               <a:rPr lang="en-US" smtClean="0"/>
-              <a:t>6/22/2019</a:t>
+              <a:t>6/23/2019</a:t>
             </a:fld>
             <a:endParaRPr lang="en-US"/>
           </a:p>
@@ -1218,7 +1218,7 @@
           <a:p>
             <a:fld id="{232015E6-04D3-AA46-8EB6-5FC99D770932}" type="datetimeFigureOut">
               <a:rPr lang="en-US" smtClean="0"/>
-              <a:t>6/22/2019</a:t>
+              <a:t>6/23/2019</a:t>
             </a:fld>
             <a:endParaRPr lang="en-US"/>
           </a:p>
@@ -1386,7 +1386,7 @@
           <a:p>
             <a:fld id="{232015E6-04D3-AA46-8EB6-5FC99D770932}" type="datetimeFigureOut">
               <a:rPr lang="en-US" smtClean="0"/>
-              <a:t>6/22/2019</a:t>
+              <a:t>6/23/2019</a:t>
             </a:fld>
             <a:endParaRPr lang="en-US"/>
           </a:p>
@@ -1631,7 +1631,7 @@
           <a:p>
             <a:fld id="{232015E6-04D3-AA46-8EB6-5FC99D770932}" type="datetimeFigureOut">
               <a:rPr lang="en-US" smtClean="0"/>
-              <a:t>6/22/2019</a:t>
+              <a:t>6/23/2019</a:t>
             </a:fld>
             <a:endParaRPr lang="en-US"/>
           </a:p>
@@ -1860,7 +1860,7 @@
           <a:p>
             <a:fld id="{232015E6-04D3-AA46-8EB6-5FC99D770932}" type="datetimeFigureOut">
               <a:rPr lang="en-US" smtClean="0"/>
-              <a:t>6/22/2019</a:t>
+              <a:t>6/23/2019</a:t>
             </a:fld>
             <a:endParaRPr lang="en-US"/>
           </a:p>
@@ -2224,7 +2224,7 @@
           <a:p>
             <a:fld id="{232015E6-04D3-AA46-8EB6-5FC99D770932}" type="datetimeFigureOut">
               <a:rPr lang="en-US" smtClean="0"/>
-              <a:t>6/22/2019</a:t>
+              <a:t>6/23/2019</a:t>
             </a:fld>
             <a:endParaRPr lang="en-US"/>
           </a:p>
@@ -2341,7 +2341,7 @@
           <a:p>
             <a:fld id="{232015E6-04D3-AA46-8EB6-5FC99D770932}" type="datetimeFigureOut">
               <a:rPr lang="en-US" smtClean="0"/>
-              <a:t>6/22/2019</a:t>
+              <a:t>6/23/2019</a:t>
             </a:fld>
             <a:endParaRPr lang="en-US"/>
           </a:p>
@@ -2436,7 +2436,7 @@
           <a:p>
             <a:fld id="{232015E6-04D3-AA46-8EB6-5FC99D770932}" type="datetimeFigureOut">
               <a:rPr lang="en-US" smtClean="0"/>
-              <a:t>6/22/2019</a:t>
+              <a:t>6/23/2019</a:t>
             </a:fld>
             <a:endParaRPr lang="en-US"/>
           </a:p>
@@ -2711,7 +2711,7 @@
           <a:p>
             <a:fld id="{232015E6-04D3-AA46-8EB6-5FC99D770932}" type="datetimeFigureOut">
               <a:rPr lang="en-US" smtClean="0"/>
-              <a:t>6/22/2019</a:t>
+              <a:t>6/23/2019</a:t>
             </a:fld>
             <a:endParaRPr lang="en-US"/>
           </a:p>
@@ -2963,7 +2963,7 @@
           <a:p>
             <a:fld id="{232015E6-04D3-AA46-8EB6-5FC99D770932}" type="datetimeFigureOut">
               <a:rPr lang="en-US" smtClean="0"/>
-              <a:t>6/22/2019</a:t>
+              <a:t>6/23/2019</a:t>
             </a:fld>
             <a:endParaRPr lang="en-US"/>
           </a:p>
@@ -3174,7 +3174,7 @@
           <a:p>
             <a:fld id="{232015E6-04D3-AA46-8EB6-5FC99D770932}" type="datetimeFigureOut">
               <a:rPr lang="en-US" smtClean="0"/>
-              <a:t>6/22/2019</a:t>
+              <a:t>6/23/2019</a:t>
             </a:fld>
             <a:endParaRPr lang="en-US"/>
           </a:p>
@@ -8959,7 +8959,7 @@
           </p:nvSpPr>
           <p:spPr>
             <a:xfrm>
-              <a:off x="5241850" y="727853"/>
+              <a:off x="5236298" y="551450"/>
               <a:ext cx="1265463" cy="307777"/>
             </a:xfrm>
             <a:prstGeom prst="hexagon">
@@ -11311,7 +11311,7 @@
         </p:nvGrpSpPr>
         <p:grpSpPr>
           <a:xfrm>
-            <a:off x="136211" y="93922"/>
+            <a:off x="9743777" y="5542426"/>
             <a:ext cx="1921075" cy="1064171"/>
             <a:chOff x="136211" y="-26894"/>
             <a:chExt cx="1921075" cy="1064171"/>
@@ -11619,10 +11619,10 @@
       </p:grpSp>
       <p:pic>
         <p:nvPicPr>
-          <p:cNvPr id="88" name="Graphic 87" descr="Internet">
+          <p:cNvPr id="90" name="Graphic 89" descr="City">
             <a:extLst>
               <a:ext uri="{FF2B5EF4-FFF2-40B4-BE49-F238E27FC236}">
-                <a16:creationId xmlns:a16="http://schemas.microsoft.com/office/drawing/2014/main" id="{F5565E34-E2C4-458D-BEA1-7DADC7257CA9}"/>
+                <a16:creationId xmlns:a16="http://schemas.microsoft.com/office/drawing/2014/main" id="{57D966A1-373D-49E1-ABDA-6D238065F52B}"/>
               </a:ext>
             </a:extLst>
           </p:cNvPr>
@@ -11645,7 +11645,7 @@
         </p:blipFill>
         <p:spPr>
           <a:xfrm>
-            <a:off x="445815" y="1373109"/>
+            <a:off x="9776938" y="93922"/>
             <a:ext cx="914400" cy="914400"/>
           </a:xfrm>
           <a:prstGeom prst="rect">
@@ -11653,89 +11653,110 @@
           </a:prstGeom>
         </p:spPr>
       </p:pic>
-      <p:pic>
-        <p:nvPicPr>
-          <p:cNvPr id="90" name="Graphic 89" descr="City">
+      <p:grpSp>
+        <p:nvGrpSpPr>
+          <p:cNvPr id="2" name="Group 1">
             <a:extLst>
               <a:ext uri="{FF2B5EF4-FFF2-40B4-BE49-F238E27FC236}">
-                <a16:creationId xmlns:a16="http://schemas.microsoft.com/office/drawing/2014/main" id="{57D966A1-373D-49E1-ABDA-6D238065F52B}"/>
+                <a16:creationId xmlns:a16="http://schemas.microsoft.com/office/drawing/2014/main" id="{6D1B9144-C550-4920-858A-EB8D456D700A}"/>
               </a:ext>
             </a:extLst>
           </p:cNvPr>
-          <p:cNvPicPr>
-            <a:picLocks noChangeAspect="1"/>
-          </p:cNvPicPr>
+          <p:cNvGrpSpPr/>
           <p:nvPr/>
-        </p:nvPicPr>
-        <p:blipFill>
-          <a:blip r:embed="rId10">
-            <a:extLst>
-              <a:ext uri="{96DAC541-7B7A-43D3-8B79-37D633B846F1}">
-                <asvg:svgBlip xmlns:asvg="http://schemas.microsoft.com/office/drawing/2016/SVG/main" r:embed="rId11"/>
-              </a:ext>
-            </a:extLst>
-          </a:blip>
-          <a:stretch>
-            <a:fillRect/>
-          </a:stretch>
-        </p:blipFill>
-        <p:spPr>
-          <a:xfrm>
-            <a:off x="9776938" y="93922"/>
-            <a:ext cx="914400" cy="914400"/>
-          </a:xfrm>
-          <a:prstGeom prst="rect">
-            <a:avLst/>
-          </a:prstGeom>
-        </p:spPr>
-      </p:pic>
-      <p:sp>
-        <p:nvSpPr>
-          <p:cNvPr id="91" name="TextBox 90">
-            <a:extLst>
-              <a:ext uri="{FF2B5EF4-FFF2-40B4-BE49-F238E27FC236}">
-                <a16:creationId xmlns:a16="http://schemas.microsoft.com/office/drawing/2014/main" id="{8645D067-1D80-4900-81E0-8707314FEE9F}"/>
-              </a:ext>
-            </a:extLst>
-          </p:cNvPr>
-          <p:cNvSpPr txBox="1"/>
-          <p:nvPr/>
-        </p:nvSpPr>
-        <p:spPr>
-          <a:xfrm>
-            <a:off x="385126" y="2141771"/>
-            <a:ext cx="1877502" cy="738664"/>
-          </a:xfrm>
-          <a:prstGeom prst="rect">
-            <a:avLst/>
-          </a:prstGeom>
-          <a:noFill/>
-        </p:spPr>
-        <p:txBody>
-          <a:bodyPr wrap="none" rtlCol="0">
-            <a:spAutoFit/>
-          </a:bodyPr>
-          <a:lstStyle/>
-          <a:p>
-            <a:r>
-              <a:rPr lang="en-US" sz="1400" b="1" dirty="0"/>
-              <a:t>LOB Apps</a:t>
-            </a:r>
-          </a:p>
-          <a:p>
-            <a:r>
-              <a:rPr lang="en-US" sz="1400" dirty="0"/>
-              <a:t>Application calls to SQL</a:t>
-            </a:r>
-          </a:p>
-          <a:p>
-            <a:r>
-              <a:rPr lang="en-US" sz="1400" dirty="0"/>
-              <a:t>Server Master Instance</a:t>
-            </a:r>
-          </a:p>
-        </p:txBody>
-      </p:sp>
+        </p:nvGrpSpPr>
+        <p:grpSpPr>
+          <a:xfrm>
+            <a:off x="381637" y="96755"/>
+            <a:ext cx="1877502" cy="1507326"/>
+            <a:chOff x="385126" y="1373109"/>
+            <a:chExt cx="1877502" cy="1507326"/>
+          </a:xfrm>
+        </p:grpSpPr>
+        <p:pic>
+          <p:nvPicPr>
+            <p:cNvPr id="88" name="Graphic 87" descr="Internet">
+              <a:extLst>
+                <a:ext uri="{FF2B5EF4-FFF2-40B4-BE49-F238E27FC236}">
+                  <a16:creationId xmlns:a16="http://schemas.microsoft.com/office/drawing/2014/main" id="{F5565E34-E2C4-458D-BEA1-7DADC7257CA9}"/>
+                </a:ext>
+              </a:extLst>
+            </p:cNvPr>
+            <p:cNvPicPr>
+              <a:picLocks noChangeAspect="1"/>
+            </p:cNvPicPr>
+            <p:nvPr/>
+          </p:nvPicPr>
+          <p:blipFill>
+            <a:blip r:embed="rId10">
+              <a:extLst>
+                <a:ext uri="{96DAC541-7B7A-43D3-8B79-37D633B846F1}">
+                  <asvg:svgBlip xmlns:asvg="http://schemas.microsoft.com/office/drawing/2016/SVG/main" r:embed="rId11"/>
+                </a:ext>
+              </a:extLst>
+            </a:blip>
+            <a:stretch>
+              <a:fillRect/>
+            </a:stretch>
+          </p:blipFill>
+          <p:spPr>
+            <a:xfrm>
+              <a:off x="445815" y="1373109"/>
+              <a:ext cx="914400" cy="914400"/>
+            </a:xfrm>
+            <a:prstGeom prst="rect">
+              <a:avLst/>
+            </a:prstGeom>
+          </p:spPr>
+        </p:pic>
+        <p:sp>
+          <p:nvSpPr>
+            <p:cNvPr id="91" name="TextBox 90">
+              <a:extLst>
+                <a:ext uri="{FF2B5EF4-FFF2-40B4-BE49-F238E27FC236}">
+                  <a16:creationId xmlns:a16="http://schemas.microsoft.com/office/drawing/2014/main" id="{8645D067-1D80-4900-81E0-8707314FEE9F}"/>
+                </a:ext>
+              </a:extLst>
+            </p:cNvPr>
+            <p:cNvSpPr txBox="1"/>
+            <p:nvPr/>
+          </p:nvSpPr>
+          <p:spPr>
+            <a:xfrm>
+              <a:off x="385126" y="2141771"/>
+              <a:ext cx="1877502" cy="738664"/>
+            </a:xfrm>
+            <a:prstGeom prst="rect">
+              <a:avLst/>
+            </a:prstGeom>
+            <a:noFill/>
+          </p:spPr>
+          <p:txBody>
+            <a:bodyPr wrap="none" rtlCol="0">
+              <a:spAutoFit/>
+            </a:bodyPr>
+            <a:lstStyle/>
+            <a:p>
+              <a:r>
+                <a:rPr lang="en-US" sz="1400" b="1" dirty="0"/>
+                <a:t>LOB Apps</a:t>
+              </a:r>
+            </a:p>
+            <a:p>
+              <a:r>
+                <a:rPr lang="en-US" sz="1400" dirty="0"/>
+                <a:t>Application calls to SQL</a:t>
+              </a:r>
+            </a:p>
+            <a:p>
+              <a:r>
+                <a:rPr lang="en-US" sz="1400" dirty="0"/>
+                <a:t>Server Master Instance</a:t>
+              </a:r>
+            </a:p>
+          </p:txBody>
+        </p:sp>
+      </p:grpSp>
       <p:sp>
         <p:nvSpPr>
           <p:cNvPr id="92" name="TextBox 91">
@@ -11751,7 +11772,7 @@
         <p:spPr>
           <a:xfrm>
             <a:off x="9740632" y="898827"/>
-            <a:ext cx="2066242" cy="1600438"/>
+            <a:ext cx="2066242" cy="1815882"/>
           </a:xfrm>
           <a:prstGeom prst="rect">
             <a:avLst/>
@@ -11772,7 +11793,7 @@
           <a:p>
             <a:r>
               <a:rPr lang="en-US" sz="1400" dirty="0"/>
-              <a:t>Data Virtualization Scale-out calls through SQL Server Master Instance using PolyBase through the Compute Pool to the Data Pool</a:t>
+              <a:t>Data Virtualization Scale-out calls through SQL Server Master Instance using External Tables, through the Compute Pool using PolyBase connectors at the source</a:t>
             </a:r>
           </a:p>
         </p:txBody>
@@ -11791,8 +11812,8 @@
         </p:nvSpPr>
         <p:spPr>
           <a:xfrm>
-            <a:off x="9738954" y="2532642"/>
-            <a:ext cx="2066241" cy="1600438"/>
+            <a:off x="9740095" y="2697174"/>
+            <a:ext cx="2066241" cy="2677656"/>
           </a:xfrm>
           <a:prstGeom prst="rect">
             <a:avLst/>
@@ -11813,17 +11834,17 @@
           <a:p>
             <a:r>
               <a:rPr lang="en-US" sz="1400" dirty="0"/>
-              <a:t>Data Mart Scale-out calls through SQL Server Master Instance using PolyBase into Data Pool. Direct calls to a Data Lake using the Storage Pool</a:t>
+              <a:t>Data Mart Scale-out calls through SQL Server Master Instance using External Tables, through the Compute Pool using PolyBase connectors at the source. Results stored in Shards of the Data Pool. Direct calls to a Data Lake using the Storage Pool</a:t>
             </a:r>
           </a:p>
         </p:txBody>
       </p:sp>
       <p:pic>
         <p:nvPicPr>
-          <p:cNvPr id="96" name="Graphic 95" descr="Head with gears">
+          <p:cNvPr id="98" name="Graphic 97" descr="Female Profile">
             <a:extLst>
               <a:ext uri="{FF2B5EF4-FFF2-40B4-BE49-F238E27FC236}">
-                <a16:creationId xmlns:a16="http://schemas.microsoft.com/office/drawing/2014/main" id="{51EF5915-F4DA-48EC-B9BF-AD4A2336BA12}"/>
+                <a16:creationId xmlns:a16="http://schemas.microsoft.com/office/drawing/2014/main" id="{88333A01-F5F2-426B-9985-DEC6D5973964}"/>
               </a:ext>
             </a:extLst>
           </p:cNvPr>
@@ -11846,7 +11867,7 @@
         </p:blipFill>
         <p:spPr>
           <a:xfrm>
-            <a:off x="445815" y="3173639"/>
+            <a:off x="433800" y="3864660"/>
             <a:ext cx="914400" cy="914400"/>
           </a:xfrm>
           <a:prstGeom prst="rect">
@@ -11854,83 +11875,104 @@
           </a:prstGeom>
         </p:spPr>
       </p:pic>
-      <p:pic>
-        <p:nvPicPr>
-          <p:cNvPr id="98" name="Graphic 97" descr="Female Profile">
+      <p:grpSp>
+        <p:nvGrpSpPr>
+          <p:cNvPr id="12" name="Group 11">
             <a:extLst>
               <a:ext uri="{FF2B5EF4-FFF2-40B4-BE49-F238E27FC236}">
-                <a16:creationId xmlns:a16="http://schemas.microsoft.com/office/drawing/2014/main" id="{88333A01-F5F2-426B-9985-DEC6D5973964}"/>
+                <a16:creationId xmlns:a16="http://schemas.microsoft.com/office/drawing/2014/main" id="{4D035CAE-A4DD-423F-B8C5-0AD889A976E5}"/>
               </a:ext>
             </a:extLst>
           </p:cNvPr>
-          <p:cNvPicPr>
-            <a:picLocks noChangeAspect="1"/>
-          </p:cNvPicPr>
+          <p:cNvGrpSpPr/>
           <p:nvPr/>
-        </p:nvPicPr>
-        <p:blipFill>
-          <a:blip r:embed="rId14">
-            <a:extLst>
-              <a:ext uri="{96DAC541-7B7A-43D3-8B79-37D633B846F1}">
-                <asvg:svgBlip xmlns:asvg="http://schemas.microsoft.com/office/drawing/2016/SVG/main" r:embed="rId15"/>
-              </a:ext>
-            </a:extLst>
-          </a:blip>
-          <a:stretch>
-            <a:fillRect/>
-          </a:stretch>
-        </p:blipFill>
-        <p:spPr>
-          <a:xfrm>
-            <a:off x="9696160" y="4234661"/>
-            <a:ext cx="914400" cy="914400"/>
-          </a:xfrm>
-          <a:prstGeom prst="rect">
-            <a:avLst/>
-          </a:prstGeom>
-        </p:spPr>
-      </p:pic>
-      <p:sp>
-        <p:nvSpPr>
-          <p:cNvPr id="99" name="TextBox 98">
-            <a:extLst>
-              <a:ext uri="{FF2B5EF4-FFF2-40B4-BE49-F238E27FC236}">
-                <a16:creationId xmlns:a16="http://schemas.microsoft.com/office/drawing/2014/main" id="{42B6BD3A-F976-44B2-A5F0-DE9B49278F61}"/>
-              </a:ext>
-            </a:extLst>
-          </p:cNvPr>
-          <p:cNvSpPr txBox="1"/>
-          <p:nvPr/>
-        </p:nvSpPr>
-        <p:spPr>
-          <a:xfrm>
-            <a:off x="381637" y="4102954"/>
-            <a:ext cx="2150132" cy="954107"/>
-          </a:xfrm>
-          <a:prstGeom prst="rect">
-            <a:avLst/>
-          </a:prstGeom>
-          <a:noFill/>
-        </p:spPr>
-        <p:txBody>
-          <a:bodyPr wrap="square" rtlCol="0">
-            <a:spAutoFit/>
-          </a:bodyPr>
-          <a:lstStyle/>
-          <a:p>
-            <a:r>
-              <a:rPr lang="en-US" sz="1400" b="1" dirty="0"/>
-              <a:t>AI Enablement</a:t>
-            </a:r>
-          </a:p>
-          <a:p>
-            <a:r>
-              <a:rPr lang="en-US" sz="1400" dirty="0"/>
-              <a:t>Prediction &amp; classification scoring to AI apps using the App Pool</a:t>
-            </a:r>
-          </a:p>
-        </p:txBody>
-      </p:sp>
+        </p:nvGrpSpPr>
+        <p:grpSpPr>
+          <a:xfrm>
+            <a:off x="385664" y="1817529"/>
+            <a:ext cx="2150132" cy="1883422"/>
+            <a:chOff x="381637" y="3173639"/>
+            <a:chExt cx="2150132" cy="1883422"/>
+          </a:xfrm>
+        </p:grpSpPr>
+        <p:pic>
+          <p:nvPicPr>
+            <p:cNvPr id="96" name="Graphic 95" descr="Head with gears">
+              <a:extLst>
+                <a:ext uri="{FF2B5EF4-FFF2-40B4-BE49-F238E27FC236}">
+                  <a16:creationId xmlns:a16="http://schemas.microsoft.com/office/drawing/2014/main" id="{51EF5915-F4DA-48EC-B9BF-AD4A2336BA12}"/>
+                </a:ext>
+              </a:extLst>
+            </p:cNvPr>
+            <p:cNvPicPr>
+              <a:picLocks noChangeAspect="1"/>
+            </p:cNvPicPr>
+            <p:nvPr/>
+          </p:nvPicPr>
+          <p:blipFill>
+            <a:blip r:embed="rId14">
+              <a:extLst>
+                <a:ext uri="{96DAC541-7B7A-43D3-8B79-37D633B846F1}">
+                  <asvg:svgBlip xmlns:asvg="http://schemas.microsoft.com/office/drawing/2016/SVG/main" r:embed="rId15"/>
+                </a:ext>
+              </a:extLst>
+            </a:blip>
+            <a:stretch>
+              <a:fillRect/>
+            </a:stretch>
+          </p:blipFill>
+          <p:spPr>
+            <a:xfrm>
+              <a:off x="445815" y="3173639"/>
+              <a:ext cx="914400" cy="914400"/>
+            </a:xfrm>
+            <a:prstGeom prst="rect">
+              <a:avLst/>
+            </a:prstGeom>
+          </p:spPr>
+        </p:pic>
+        <p:sp>
+          <p:nvSpPr>
+            <p:cNvPr id="99" name="TextBox 98">
+              <a:extLst>
+                <a:ext uri="{FF2B5EF4-FFF2-40B4-BE49-F238E27FC236}">
+                  <a16:creationId xmlns:a16="http://schemas.microsoft.com/office/drawing/2014/main" id="{42B6BD3A-F976-44B2-A5F0-DE9B49278F61}"/>
+                </a:ext>
+              </a:extLst>
+            </p:cNvPr>
+            <p:cNvSpPr txBox="1"/>
+            <p:nvPr/>
+          </p:nvSpPr>
+          <p:spPr>
+            <a:xfrm>
+              <a:off x="381637" y="4102954"/>
+              <a:ext cx="2150132" cy="954107"/>
+            </a:xfrm>
+            <a:prstGeom prst="rect">
+              <a:avLst/>
+            </a:prstGeom>
+            <a:noFill/>
+          </p:spPr>
+          <p:txBody>
+            <a:bodyPr wrap="square" rtlCol="0">
+              <a:spAutoFit/>
+            </a:bodyPr>
+            <a:lstStyle/>
+            <a:p>
+              <a:r>
+                <a:rPr lang="en-US" sz="1400" b="1" dirty="0"/>
+                <a:t>AI Enablement</a:t>
+              </a:r>
+            </a:p>
+            <a:p>
+              <a:r>
+                <a:rPr lang="en-US" sz="1400" dirty="0"/>
+                <a:t>Prediction &amp; classification scoring to AI apps using the App Pool</a:t>
+              </a:r>
+            </a:p>
+          </p:txBody>
+        </p:sp>
+      </p:grpSp>
       <p:sp>
         <p:nvSpPr>
           <p:cNvPr id="100" name="TextBox 99">
@@ -11945,7 +11987,7 @@
         </p:nvSpPr>
         <p:spPr>
           <a:xfrm>
-            <a:off x="9738913" y="5055078"/>
+            <a:off x="385109" y="4742207"/>
             <a:ext cx="2238094" cy="1600438"/>
           </a:xfrm>
           <a:prstGeom prst="rect">
@@ -12219,14 +12261,15 @@
             </a:extLst>
           </p:cNvPr>
           <p:cNvCxnSpPr>
+            <a:cxnSpLocks/>
             <a:stCxn id="88" idx="3"/>
           </p:cNvCxnSpPr>
           <p:nvPr/>
         </p:nvCxnSpPr>
         <p:spPr>
-          <a:xfrm flipV="1">
-            <a:off x="1360215" y="1567903"/>
-            <a:ext cx="1497285" cy="262406"/>
+          <a:xfrm>
+            <a:off x="1356726" y="553955"/>
+            <a:ext cx="1517579" cy="333455"/>
           </a:xfrm>
           <a:prstGeom prst="line">
             <a:avLst/>
@@ -12264,7 +12307,7 @@
         </p:nvCxnSpPr>
         <p:spPr>
           <a:xfrm flipV="1">
-            <a:off x="1360215" y="3414288"/>
+            <a:off x="1364242" y="2058178"/>
             <a:ext cx="1497285" cy="216551"/>
           </a:xfrm>
           <a:prstGeom prst="line">
@@ -12336,14 +12379,14 @@
           </p:cNvPr>
           <p:cNvCxnSpPr>
             <a:cxnSpLocks/>
-            <a:endCxn id="98" idx="1"/>
+            <a:stCxn id="98" idx="3"/>
           </p:cNvCxnSpPr>
           <p:nvPr/>
         </p:nvCxnSpPr>
         <p:spPr>
-          <a:xfrm>
-            <a:off x="9334499" y="4499270"/>
-            <a:ext cx="361661" cy="192591"/>
+          <a:xfrm flipV="1">
+            <a:off x="1348200" y="4131292"/>
+            <a:ext cx="1513327" cy="190568"/>
           </a:xfrm>
           <a:prstGeom prst="line">
             <a:avLst/>
@@ -12364,6 +12407,55 @@
           </a:fontRef>
         </p:style>
       </p:cxnSp>
+      <p:sp>
+        <p:nvSpPr>
+          <p:cNvPr id="95" name="Hexagon 94">
+            <a:extLst>
+              <a:ext uri="{FF2B5EF4-FFF2-40B4-BE49-F238E27FC236}">
+                <a16:creationId xmlns:a16="http://schemas.microsoft.com/office/drawing/2014/main" id="{2C2F7FB0-9703-4A30-ABF2-E6B509525041}"/>
+              </a:ext>
+            </a:extLst>
+          </p:cNvPr>
+          <p:cNvSpPr/>
+          <p:nvPr/>
+        </p:nvSpPr>
+        <p:spPr>
+          <a:xfrm>
+            <a:off x="5451564" y="1065332"/>
+            <a:ext cx="1265463" cy="307777"/>
+          </a:xfrm>
+          <a:prstGeom prst="hexagon">
+            <a:avLst/>
+          </a:prstGeom>
+        </p:spPr>
+        <p:style>
+          <a:lnRef idx="2">
+            <a:schemeClr val="accent1"/>
+          </a:lnRef>
+          <a:fillRef idx="1">
+            <a:schemeClr val="lt1"/>
+          </a:fillRef>
+          <a:effectRef idx="0">
+            <a:schemeClr val="accent1"/>
+          </a:effectRef>
+          <a:fontRef idx="minor">
+            <a:schemeClr val="dk1"/>
+          </a:fontRef>
+        </p:style>
+        <p:txBody>
+          <a:bodyPr rtlCol="0" anchor="ctr"/>
+          <a:lstStyle/>
+          <a:p>
+            <a:pPr algn="ctr"/>
+            <a:r>
+              <a:rPr lang="en-US" sz="1200" dirty="0">
+                <a:cs typeface="Segoe UI Semibold" panose="020B0702040204020203" pitchFamily="34" charset="0"/>
+              </a:rPr>
+              <a:t>SSIS</a:t>
+            </a:r>
+          </a:p>
+        </p:txBody>
+      </p:sp>
     </p:spTree>
     <p:extLst>
       <p:ext uri="{BB962C8B-B14F-4D97-AF65-F5344CB8AC3E}">

</xml_diff>

<commit_message>
Fleshed out AI portion of WDS
</commit_message>
<xml_diff>
--- a/Whiteboard design session/media/diagrams.pptx
+++ b/Whiteboard design session/media/diagrams.pptx
@@ -200,7 +200,7 @@
           <a:p>
             <a:fld id="{90D82B7B-9A37-0949-A600-BA30C7EE531A}" type="datetimeFigureOut">
               <a:rPr lang="en-US" smtClean="0"/>
-              <a:t>6/23/2019</a:t>
+              <a:t>6/24/2019</a:t>
             </a:fld>
             <a:endParaRPr lang="en-US"/>
           </a:p>
@@ -872,7 +872,7 @@
           <a:p>
             <a:fld id="{232015E6-04D3-AA46-8EB6-5FC99D770932}" type="datetimeFigureOut">
               <a:rPr lang="en-US" smtClean="0"/>
-              <a:t>6/23/2019</a:t>
+              <a:t>6/24/2019</a:t>
             </a:fld>
             <a:endParaRPr lang="en-US"/>
           </a:p>
@@ -1040,7 +1040,7 @@
           <a:p>
             <a:fld id="{232015E6-04D3-AA46-8EB6-5FC99D770932}" type="datetimeFigureOut">
               <a:rPr lang="en-US" smtClean="0"/>
-              <a:t>6/23/2019</a:t>
+              <a:t>6/24/2019</a:t>
             </a:fld>
             <a:endParaRPr lang="en-US"/>
           </a:p>
@@ -1218,7 +1218,7 @@
           <a:p>
             <a:fld id="{232015E6-04D3-AA46-8EB6-5FC99D770932}" type="datetimeFigureOut">
               <a:rPr lang="en-US" smtClean="0"/>
-              <a:t>6/23/2019</a:t>
+              <a:t>6/24/2019</a:t>
             </a:fld>
             <a:endParaRPr lang="en-US"/>
           </a:p>
@@ -1386,7 +1386,7 @@
           <a:p>
             <a:fld id="{232015E6-04D3-AA46-8EB6-5FC99D770932}" type="datetimeFigureOut">
               <a:rPr lang="en-US" smtClean="0"/>
-              <a:t>6/23/2019</a:t>
+              <a:t>6/24/2019</a:t>
             </a:fld>
             <a:endParaRPr lang="en-US"/>
           </a:p>
@@ -1631,7 +1631,7 @@
           <a:p>
             <a:fld id="{232015E6-04D3-AA46-8EB6-5FC99D770932}" type="datetimeFigureOut">
               <a:rPr lang="en-US" smtClean="0"/>
-              <a:t>6/23/2019</a:t>
+              <a:t>6/24/2019</a:t>
             </a:fld>
             <a:endParaRPr lang="en-US"/>
           </a:p>
@@ -1860,7 +1860,7 @@
           <a:p>
             <a:fld id="{232015E6-04D3-AA46-8EB6-5FC99D770932}" type="datetimeFigureOut">
               <a:rPr lang="en-US" smtClean="0"/>
-              <a:t>6/23/2019</a:t>
+              <a:t>6/24/2019</a:t>
             </a:fld>
             <a:endParaRPr lang="en-US"/>
           </a:p>
@@ -2224,7 +2224,7 @@
           <a:p>
             <a:fld id="{232015E6-04D3-AA46-8EB6-5FC99D770932}" type="datetimeFigureOut">
               <a:rPr lang="en-US" smtClean="0"/>
-              <a:t>6/23/2019</a:t>
+              <a:t>6/24/2019</a:t>
             </a:fld>
             <a:endParaRPr lang="en-US"/>
           </a:p>
@@ -2341,7 +2341,7 @@
           <a:p>
             <a:fld id="{232015E6-04D3-AA46-8EB6-5FC99D770932}" type="datetimeFigureOut">
               <a:rPr lang="en-US" smtClean="0"/>
-              <a:t>6/23/2019</a:t>
+              <a:t>6/24/2019</a:t>
             </a:fld>
             <a:endParaRPr lang="en-US"/>
           </a:p>
@@ -2436,7 +2436,7 @@
           <a:p>
             <a:fld id="{232015E6-04D3-AA46-8EB6-5FC99D770932}" type="datetimeFigureOut">
               <a:rPr lang="en-US" smtClean="0"/>
-              <a:t>6/23/2019</a:t>
+              <a:t>6/24/2019</a:t>
             </a:fld>
             <a:endParaRPr lang="en-US"/>
           </a:p>
@@ -2711,7 +2711,7 @@
           <a:p>
             <a:fld id="{232015E6-04D3-AA46-8EB6-5FC99D770932}" type="datetimeFigureOut">
               <a:rPr lang="en-US" smtClean="0"/>
-              <a:t>6/23/2019</a:t>
+              <a:t>6/24/2019</a:t>
             </a:fld>
             <a:endParaRPr lang="en-US"/>
           </a:p>
@@ -2963,7 +2963,7 @@
           <a:p>
             <a:fld id="{232015E6-04D3-AA46-8EB6-5FC99D770932}" type="datetimeFigureOut">
               <a:rPr lang="en-US" smtClean="0"/>
-              <a:t>6/23/2019</a:t>
+              <a:t>6/24/2019</a:t>
             </a:fld>
             <a:endParaRPr lang="en-US"/>
           </a:p>
@@ -3174,7 +3174,7 @@
           <a:p>
             <a:fld id="{232015E6-04D3-AA46-8EB6-5FC99D770932}" type="datetimeFigureOut">
               <a:rPr lang="en-US" smtClean="0"/>
-              <a:t>6/23/2019</a:t>
+              <a:t>6/24/2019</a:t>
             </a:fld>
             <a:endParaRPr lang="en-US"/>
           </a:p>
@@ -4067,7 +4067,7 @@
         </p:nvSpPr>
         <p:spPr>
           <a:xfrm>
-            <a:off x="4696967" y="1948131"/>
+            <a:off x="4696967" y="1948130"/>
             <a:ext cx="1620456" cy="4016415"/>
           </a:xfrm>
           <a:prstGeom prst="rect">
@@ -4441,7 +4441,7 @@
         </p:blipFill>
         <p:spPr>
           <a:xfrm>
-            <a:off x="9445788" y="3395581"/>
+            <a:off x="9435962" y="3010994"/>
             <a:ext cx="418006" cy="418006"/>
           </a:xfrm>
           <a:prstGeom prst="rect">
@@ -4449,178 +4449,205 @@
           </a:prstGeom>
         </p:spPr>
       </p:pic>
+      <p:sp>
+        <p:nvSpPr>
+          <p:cNvPr id="24" name="TextBox 23"/>
+          <p:cNvSpPr txBox="1"/>
+          <p:nvPr/>
+        </p:nvSpPr>
+        <p:spPr>
+          <a:xfrm>
+            <a:off x="4727250" y="3137219"/>
+            <a:ext cx="1628148" cy="707886"/>
+          </a:xfrm>
+          <a:prstGeom prst="rect">
+            <a:avLst/>
+          </a:prstGeom>
+          <a:noFill/>
+        </p:spPr>
+        <p:txBody>
+          <a:bodyPr wrap="square" rtlCol="0">
+            <a:spAutoFit/>
+          </a:bodyPr>
+          <a:lstStyle/>
+          <a:p>
+            <a:pPr algn="ctr"/>
+            <a:r>
+              <a:rPr lang="en-US" sz="2000" dirty="0"/>
+              <a:t>SQL Server</a:t>
+            </a:r>
+          </a:p>
+          <a:p>
+            <a:pPr algn="ctr"/>
+            <a:r>
+              <a:rPr lang="en-US" sz="2000" dirty="0"/>
+              <a:t>data pool</a:t>
+            </a:r>
+          </a:p>
+        </p:txBody>
+      </p:sp>
+      <p:sp>
+        <p:nvSpPr>
+          <p:cNvPr id="25" name="TextBox 24"/>
+          <p:cNvSpPr txBox="1"/>
+          <p:nvPr/>
+        </p:nvSpPr>
+        <p:spPr>
+          <a:xfrm>
+            <a:off x="5168915" y="5137488"/>
+            <a:ext cx="949124" cy="400110"/>
+          </a:xfrm>
+          <a:prstGeom prst="rect">
+            <a:avLst/>
+          </a:prstGeom>
+          <a:noFill/>
+        </p:spPr>
+        <p:txBody>
+          <a:bodyPr wrap="square" rtlCol="0">
+            <a:spAutoFit/>
+          </a:bodyPr>
+          <a:lstStyle/>
+          <a:p>
+            <a:r>
+              <a:rPr lang="en-US" sz="2000" dirty="0"/>
+              <a:t>HDFS</a:t>
+            </a:r>
+          </a:p>
+        </p:txBody>
+      </p:sp>
       <p:grpSp>
         <p:nvGrpSpPr>
-          <p:cNvPr id="20" name="Group 19"/>
+          <p:cNvPr id="2" name="Group 1">
+            <a:extLst>
+              <a:ext uri="{FF2B5EF4-FFF2-40B4-BE49-F238E27FC236}">
+                <a16:creationId xmlns:a16="http://schemas.microsoft.com/office/drawing/2014/main" id="{6F782B75-C39E-4E0C-B568-2ED7A314F3E0}"/>
+              </a:ext>
+            </a:extLst>
+          </p:cNvPr>
           <p:cNvGrpSpPr/>
           <p:nvPr/>
         </p:nvGrpSpPr>
         <p:grpSpPr>
           <a:xfrm>
-            <a:off x="7341875" y="4300977"/>
-            <a:ext cx="509193" cy="509193"/>
-            <a:chOff x="6836849" y="3962545"/>
-            <a:chExt cx="509193" cy="509193"/>
+            <a:off x="6686490" y="4300977"/>
+            <a:ext cx="1757423" cy="1390416"/>
+            <a:chOff x="6686490" y="4300977"/>
+            <a:chExt cx="1757423" cy="1390416"/>
           </a:xfrm>
         </p:grpSpPr>
-        <p:pic>
-          <p:nvPicPr>
-            <p:cNvPr id="19" name="Picture 18"/>
-            <p:cNvPicPr>
-              <a:picLocks noChangeAspect="1"/>
-            </p:cNvPicPr>
+        <p:grpSp>
+          <p:nvGrpSpPr>
+            <p:cNvPr id="20" name="Group 19"/>
+            <p:cNvGrpSpPr/>
             <p:nvPr/>
-          </p:nvPicPr>
-          <p:blipFill>
-            <a:blip r:embed="rId4">
-              <a:extLst>
-                <a:ext uri="{28A0092B-C50C-407E-A947-70E740481C1C}">
-                  <a14:useLocalDpi xmlns:a14="http://schemas.microsoft.com/office/drawing/2010/main" val="0"/>
-                </a:ext>
-              </a:extLst>
-            </a:blip>
-            <a:stretch>
-              <a:fillRect/>
-            </a:stretch>
-          </p:blipFill>
+          </p:nvGrpSpPr>
+          <p:grpSpPr>
+            <a:xfrm>
+              <a:off x="7341875" y="4300977"/>
+              <a:ext cx="509193" cy="509193"/>
+              <a:chOff x="6836849" y="3962545"/>
+              <a:chExt cx="509193" cy="509193"/>
+            </a:xfrm>
+          </p:grpSpPr>
+          <p:pic>
+            <p:nvPicPr>
+              <p:cNvPr id="19" name="Picture 18"/>
+              <p:cNvPicPr>
+                <a:picLocks noChangeAspect="1"/>
+              </p:cNvPicPr>
+              <p:nvPr/>
+            </p:nvPicPr>
+            <p:blipFill>
+              <a:blip r:embed="rId4">
+                <a:extLst>
+                  <a:ext uri="{28A0092B-C50C-407E-A947-70E740481C1C}">
+                    <a14:useLocalDpi xmlns:a14="http://schemas.microsoft.com/office/drawing/2010/main" val="0"/>
+                  </a:ext>
+                </a:extLst>
+              </a:blip>
+              <a:stretch>
+                <a:fillRect/>
+              </a:stretch>
+            </p:blipFill>
+            <p:spPr>
+              <a:xfrm>
+                <a:off x="6836849" y="3962545"/>
+                <a:ext cx="501501" cy="501501"/>
+              </a:xfrm>
+              <a:prstGeom prst="rect">
+                <a:avLst/>
+              </a:prstGeom>
+            </p:spPr>
+          </p:pic>
+          <p:pic>
+            <p:nvPicPr>
+              <p:cNvPr id="18" name="Picture 17"/>
+              <p:cNvPicPr>
+                <a:picLocks noChangeAspect="1"/>
+              </p:cNvPicPr>
+              <p:nvPr/>
+            </p:nvPicPr>
+            <p:blipFill>
+              <a:blip r:embed="rId5">
+                <a:extLst>
+                  <a:ext uri="{28A0092B-C50C-407E-A947-70E740481C1C}">
+                    <a14:useLocalDpi xmlns:a14="http://schemas.microsoft.com/office/drawing/2010/main" val="0"/>
+                  </a:ext>
+                </a:extLst>
+              </a:blip>
+              <a:stretch>
+                <a:fillRect/>
+              </a:stretch>
+            </p:blipFill>
+            <p:spPr>
+              <a:xfrm>
+                <a:off x="7087599" y="4213295"/>
+                <a:ext cx="258443" cy="258443"/>
+              </a:xfrm>
+              <a:prstGeom prst="rect">
+                <a:avLst/>
+              </a:prstGeom>
+            </p:spPr>
+          </p:pic>
+        </p:grpSp>
+        <p:sp>
+          <p:nvSpPr>
+            <p:cNvPr id="26" name="TextBox 25"/>
+            <p:cNvSpPr txBox="1"/>
+            <p:nvPr/>
+          </p:nvSpPr>
           <p:spPr>
             <a:xfrm>
-              <a:off x="6836849" y="3962545"/>
-              <a:ext cx="501501" cy="501501"/>
+              <a:off x="6686490" y="4768063"/>
+              <a:ext cx="1757423" cy="923330"/>
             </a:xfrm>
             <a:prstGeom prst="rect">
               <a:avLst/>
             </a:prstGeom>
+            <a:noFill/>
           </p:spPr>
-        </p:pic>
-        <p:pic>
-          <p:nvPicPr>
-            <p:cNvPr id="18" name="Picture 17"/>
-            <p:cNvPicPr>
-              <a:picLocks noChangeAspect="1"/>
-            </p:cNvPicPr>
-            <p:nvPr/>
-          </p:nvPicPr>
-          <p:blipFill>
-            <a:blip r:embed="rId5">
-              <a:extLst>
-                <a:ext uri="{28A0092B-C50C-407E-A947-70E740481C1C}">
-                  <a14:useLocalDpi xmlns:a14="http://schemas.microsoft.com/office/drawing/2010/main" val="0"/>
-                </a:ext>
-              </a:extLst>
-            </a:blip>
-            <a:stretch>
-              <a:fillRect/>
-            </a:stretch>
-          </p:blipFill>
-          <p:spPr>
-            <a:xfrm>
-              <a:off x="7087599" y="4213295"/>
-              <a:ext cx="258443" cy="258443"/>
-            </a:xfrm>
-            <a:prstGeom prst="rect">
-              <a:avLst/>
-            </a:prstGeom>
-          </p:spPr>
-        </p:pic>
+          <p:txBody>
+            <a:bodyPr wrap="square" rtlCol="0">
+              <a:spAutoFit/>
+            </a:bodyPr>
+            <a:lstStyle/>
+            <a:p>
+              <a:pPr algn="ctr"/>
+              <a:r>
+                <a:rPr lang="en-US" dirty="0"/>
+                <a:t>Machine Learning</a:t>
+              </a:r>
+              <a:br>
+                <a:rPr lang="en-US" dirty="0"/>
+              </a:br>
+              <a:r>
+                <a:rPr lang="en-US" dirty="0"/>
+                <a:t>Services</a:t>
+              </a:r>
+            </a:p>
+          </p:txBody>
+        </p:sp>
       </p:grpSp>
-      <p:sp>
-        <p:nvSpPr>
-          <p:cNvPr id="24" name="TextBox 23"/>
-          <p:cNvSpPr txBox="1"/>
-          <p:nvPr/>
-        </p:nvSpPr>
-        <p:spPr>
-          <a:xfrm>
-            <a:off x="4780896" y="3105602"/>
-            <a:ext cx="1628148" cy="830997"/>
-          </a:xfrm>
-          <a:prstGeom prst="rect">
-            <a:avLst/>
-          </a:prstGeom>
-          <a:noFill/>
-        </p:spPr>
-        <p:txBody>
-          <a:bodyPr wrap="square" rtlCol="0">
-            <a:spAutoFit/>
-          </a:bodyPr>
-          <a:lstStyle/>
-          <a:p>
-            <a:pPr algn="ctr"/>
-            <a:r>
-              <a:rPr lang="en-US" sz="2400" dirty="0"/>
-              <a:t>SQL Server</a:t>
-            </a:r>
-          </a:p>
-          <a:p>
-            <a:pPr algn="ctr"/>
-            <a:r>
-              <a:rPr lang="en-US" sz="2400" dirty="0"/>
-              <a:t>data pools</a:t>
-            </a:r>
-          </a:p>
-        </p:txBody>
-      </p:sp>
-      <p:sp>
-        <p:nvSpPr>
-          <p:cNvPr id="25" name="TextBox 24"/>
-          <p:cNvSpPr txBox="1"/>
-          <p:nvPr/>
-        </p:nvSpPr>
-        <p:spPr>
-          <a:xfrm>
-            <a:off x="5094881" y="5145676"/>
-            <a:ext cx="949124" cy="461665"/>
-          </a:xfrm>
-          <a:prstGeom prst="rect">
-            <a:avLst/>
-          </a:prstGeom>
-          <a:noFill/>
-        </p:spPr>
-        <p:txBody>
-          <a:bodyPr wrap="square" rtlCol="0">
-            <a:spAutoFit/>
-          </a:bodyPr>
-          <a:lstStyle/>
-          <a:p>
-            <a:r>
-              <a:rPr lang="en-US" sz="2400"/>
-              <a:t>HDFS</a:t>
-            </a:r>
-            <a:endParaRPr lang="en-US" sz="2400" dirty="0"/>
-          </a:p>
-        </p:txBody>
-      </p:sp>
-      <p:sp>
-        <p:nvSpPr>
-          <p:cNvPr id="26" name="TextBox 25"/>
-          <p:cNvSpPr txBox="1"/>
-          <p:nvPr/>
-        </p:nvSpPr>
-        <p:spPr>
-          <a:xfrm>
-            <a:off x="6770765" y="4768063"/>
-            <a:ext cx="1725591" cy="1200329"/>
-          </a:xfrm>
-          <a:prstGeom prst="rect">
-            <a:avLst/>
-          </a:prstGeom>
-          <a:noFill/>
-        </p:spPr>
-        <p:txBody>
-          <a:bodyPr wrap="square" rtlCol="0">
-            <a:spAutoFit/>
-          </a:bodyPr>
-          <a:lstStyle/>
-          <a:p>
-            <a:pPr algn="ctr"/>
-            <a:r>
-              <a:rPr lang="en-US" sz="2400" dirty="0"/>
-              <a:t>Machine Learning Services</a:t>
-            </a:r>
-          </a:p>
-        </p:txBody>
-      </p:sp>
       <p:pic>
         <p:nvPicPr>
           <p:cNvPr id="27" name="Picture 26"/>
@@ -4664,8 +4691,8 @@
         </p:nvSpPr>
         <p:spPr>
           <a:xfrm>
-            <a:off x="8806588" y="3834969"/>
-            <a:ext cx="1725591" cy="1200329"/>
+            <a:off x="8796762" y="3450382"/>
+            <a:ext cx="1725591" cy="923330"/>
           </a:xfrm>
           <a:prstGeom prst="rect">
             <a:avLst/>
@@ -4680,21 +4707,21 @@
           <a:p>
             <a:pPr algn="ctr"/>
             <a:r>
-              <a:rPr lang="en-US" sz="2400" dirty="0"/>
+              <a:rPr lang="en-US" dirty="0"/>
               <a:t>SQL Server</a:t>
             </a:r>
           </a:p>
           <a:p>
             <a:pPr algn="ctr"/>
             <a:r>
-              <a:rPr lang="en-US" sz="2400" dirty="0"/>
+              <a:rPr lang="en-US" dirty="0"/>
               <a:t>master</a:t>
             </a:r>
           </a:p>
           <a:p>
             <a:pPr algn="ctr"/>
             <a:r>
-              <a:rPr lang="en-US" sz="2400" dirty="0"/>
+              <a:rPr lang="en-US" dirty="0"/>
               <a:t>instance</a:t>
             </a:r>
           </a:p>
@@ -4788,7 +4815,7 @@
         </p:blipFill>
         <p:spPr>
           <a:xfrm>
-            <a:off x="544351" y="1238042"/>
+            <a:off x="681214" y="1221775"/>
             <a:ext cx="577862" cy="577862"/>
           </a:xfrm>
           <a:prstGeom prst="rect">
@@ -4850,7 +4877,7 @@
         </p:blipFill>
         <p:spPr>
           <a:xfrm>
-            <a:off x="671238" y="5014448"/>
+            <a:off x="698587" y="5014448"/>
             <a:ext cx="543113" cy="543113"/>
           </a:xfrm>
           <a:prstGeom prst="rect">
@@ -4866,7 +4893,7 @@
         </p:nvGrpSpPr>
         <p:grpSpPr>
           <a:xfrm>
-            <a:off x="658973" y="3012675"/>
+            <a:off x="795836" y="2992506"/>
             <a:ext cx="348618" cy="822294"/>
             <a:chOff x="732847" y="2372810"/>
             <a:chExt cx="488701" cy="1152711"/>
@@ -4943,8 +4970,8 @@
         </p:nvSpPr>
         <p:spPr>
           <a:xfrm>
-            <a:off x="71441" y="1796043"/>
-            <a:ext cx="2058302" cy="1200329"/>
+            <a:off x="92078" y="1796043"/>
+            <a:ext cx="1736290" cy="1015663"/>
           </a:xfrm>
           <a:prstGeom prst="rect">
             <a:avLst/>
@@ -4959,21 +4986,21 @@
           <a:p>
             <a:pPr algn="ctr"/>
             <a:r>
-              <a:rPr lang="en-US" sz="2400" dirty="0"/>
+              <a:rPr lang="en-US" sz="2000" dirty="0"/>
               <a:t>Logs, files</a:t>
             </a:r>
           </a:p>
           <a:p>
             <a:pPr algn="ctr"/>
             <a:r>
-              <a:rPr lang="en-US" sz="2400" dirty="0"/>
+              <a:rPr lang="en-US" sz="2000" dirty="0"/>
               <a:t>and media</a:t>
             </a:r>
           </a:p>
           <a:p>
             <a:pPr algn="ctr"/>
             <a:r>
-              <a:rPr lang="en-US" sz="2400" dirty="0"/>
+              <a:rPr lang="en-US" sz="2000" dirty="0"/>
               <a:t>(unstructured)</a:t>
             </a:r>
           </a:p>
@@ -4987,8 +5014,8 @@
         </p:nvSpPr>
         <p:spPr>
           <a:xfrm>
-            <a:off x="96938" y="3711338"/>
-            <a:ext cx="2218000" cy="830997"/>
+            <a:off x="92078" y="3701351"/>
+            <a:ext cx="1817065" cy="707886"/>
           </a:xfrm>
           <a:prstGeom prst="rect">
             <a:avLst/>
@@ -5003,14 +5030,14 @@
           <a:p>
             <a:pPr algn="ctr"/>
             <a:r>
-              <a:rPr lang="en-US" sz="2400" dirty="0"/>
+              <a:rPr lang="en-US" sz="2000" dirty="0"/>
               <a:t>Sensors and IoT</a:t>
             </a:r>
           </a:p>
           <a:p>
             <a:pPr algn="ctr"/>
             <a:r>
-              <a:rPr lang="en-US" sz="2400" dirty="0"/>
+              <a:rPr lang="en-US" sz="2000" dirty="0"/>
               <a:t>(unstructured)</a:t>
             </a:r>
           </a:p>
@@ -5024,8 +5051,8 @@
         </p:nvSpPr>
         <p:spPr>
           <a:xfrm>
-            <a:off x="276175" y="5476113"/>
-            <a:ext cx="1817065" cy="1200329"/>
+            <a:off x="92078" y="5476113"/>
+            <a:ext cx="1721886" cy="1015663"/>
           </a:xfrm>
           <a:prstGeom prst="rect">
             <a:avLst/>
@@ -5040,25 +5067,21 @@
           <a:p>
             <a:pPr algn="ctr"/>
             <a:r>
-              <a:rPr lang="en-US" sz="2400"/>
+              <a:rPr lang="en-US" sz="2000" dirty="0"/>
               <a:t>Business /</a:t>
             </a:r>
             <a:br>
-              <a:rPr lang="en-US" sz="2400"/>
+              <a:rPr lang="en-US" sz="2000" dirty="0"/>
             </a:br>
             <a:r>
-              <a:rPr lang="en-US" sz="2400"/>
-              <a:t>custom </a:t>
-            </a:r>
-            <a:r>
-              <a:rPr lang="en-US" sz="2400" dirty="0"/>
-              <a:t>apps</a:t>
+              <a:rPr lang="en-US" sz="2000" dirty="0"/>
+              <a:t>custom apps</a:t>
             </a:r>
           </a:p>
           <a:p>
             <a:pPr algn="ctr"/>
             <a:r>
-              <a:rPr lang="en-US" sz="2400" dirty="0"/>
+              <a:rPr lang="en-US" sz="2000" dirty="0"/>
               <a:t>(structured)</a:t>
             </a:r>
           </a:p>
@@ -5067,13 +5090,15 @@
       <p:cxnSp>
         <p:nvCxnSpPr>
           <p:cNvPr id="41" name="Straight Arrow Connector 40"/>
-          <p:cNvCxnSpPr/>
+          <p:cNvCxnSpPr>
+            <a:cxnSpLocks/>
+          </p:cNvCxnSpPr>
           <p:nvPr/>
         </p:nvCxnSpPr>
         <p:spPr>
           <a:xfrm>
-            <a:off x="2197127" y="2518809"/>
-            <a:ext cx="534362" cy="29887"/>
+            <a:off x="2207802" y="2548696"/>
+            <a:ext cx="523687" cy="0"/>
           </a:xfrm>
           <a:prstGeom prst="straightConnector1">
             <a:avLst/>
@@ -5173,13 +5198,15 @@
       <p:cxnSp>
         <p:nvCxnSpPr>
           <p:cNvPr id="49" name="Straight Connector 48"/>
-          <p:cNvCxnSpPr/>
+          <p:cNvCxnSpPr>
+            <a:cxnSpLocks/>
+          </p:cNvCxnSpPr>
           <p:nvPr/>
         </p:nvCxnSpPr>
         <p:spPr>
           <a:xfrm flipH="1" flipV="1">
-            <a:off x="1828367" y="4566772"/>
-            <a:ext cx="433563" cy="10092"/>
+            <a:off x="1828368" y="4566772"/>
+            <a:ext cx="405563" cy="6253"/>
           </a:xfrm>
           <a:prstGeom prst="line">
             <a:avLst/>
@@ -5208,13 +5235,15 @@
       <p:cxnSp>
         <p:nvCxnSpPr>
           <p:cNvPr id="52" name="Straight Arrow Connector 51"/>
-          <p:cNvCxnSpPr/>
+          <p:cNvCxnSpPr>
+            <a:cxnSpLocks/>
+          </p:cNvCxnSpPr>
           <p:nvPr/>
         </p:nvCxnSpPr>
         <p:spPr>
           <a:xfrm>
-            <a:off x="2258200" y="5274888"/>
-            <a:ext cx="534362" cy="29887"/>
+            <a:off x="2207802" y="5304775"/>
+            <a:ext cx="584760" cy="0"/>
           </a:xfrm>
           <a:prstGeom prst="straightConnector1">
             <a:avLst/>
@@ -5244,13 +5273,15 @@
       <p:cxnSp>
         <p:nvCxnSpPr>
           <p:cNvPr id="53" name="Straight Connector 52"/>
-          <p:cNvCxnSpPr/>
+          <p:cNvCxnSpPr>
+            <a:cxnSpLocks/>
+          </p:cNvCxnSpPr>
           <p:nvPr/>
         </p:nvCxnSpPr>
         <p:spPr>
           <a:xfrm flipV="1">
-            <a:off x="2185833" y="4809928"/>
-            <a:ext cx="21969" cy="1866514"/>
+            <a:off x="2203884" y="4809928"/>
+            <a:ext cx="3918" cy="1866514"/>
           </a:xfrm>
           <a:prstGeom prst="line">
             <a:avLst/>
@@ -5314,13 +5345,15 @@
       <p:cxnSp>
         <p:nvCxnSpPr>
           <p:cNvPr id="55" name="Straight Connector 54"/>
-          <p:cNvCxnSpPr/>
+          <p:cNvCxnSpPr>
+            <a:cxnSpLocks/>
+          </p:cNvCxnSpPr>
           <p:nvPr/>
         </p:nvCxnSpPr>
         <p:spPr>
-          <a:xfrm flipH="1" flipV="1">
-            <a:off x="1795087" y="6676442"/>
-            <a:ext cx="433563" cy="10092"/>
+          <a:xfrm flipH="1">
+            <a:off x="1795088" y="6676442"/>
+            <a:ext cx="452438" cy="0"/>
           </a:xfrm>
           <a:prstGeom prst="line">
             <a:avLst/>
@@ -5475,6 +5508,242 @@
           </a:prstGeom>
         </p:spPr>
       </p:pic>
+      <p:grpSp>
+        <p:nvGrpSpPr>
+          <p:cNvPr id="46" name="Group 45">
+            <a:extLst>
+              <a:ext uri="{FF2B5EF4-FFF2-40B4-BE49-F238E27FC236}">
+                <a16:creationId xmlns:a16="http://schemas.microsoft.com/office/drawing/2014/main" id="{C80FC3F4-E3DD-4014-A5A8-1247D3228AC9}"/>
+              </a:ext>
+            </a:extLst>
+          </p:cNvPr>
+          <p:cNvGrpSpPr/>
+          <p:nvPr/>
+        </p:nvGrpSpPr>
+        <p:grpSpPr>
+          <a:xfrm>
+            <a:off x="8780459" y="4566772"/>
+            <a:ext cx="1757423" cy="1390416"/>
+            <a:chOff x="6686490" y="4300977"/>
+            <a:chExt cx="1757423" cy="1390416"/>
+          </a:xfrm>
+        </p:grpSpPr>
+        <p:grpSp>
+          <p:nvGrpSpPr>
+            <p:cNvPr id="47" name="Group 46">
+              <a:extLst>
+                <a:ext uri="{FF2B5EF4-FFF2-40B4-BE49-F238E27FC236}">
+                  <a16:creationId xmlns:a16="http://schemas.microsoft.com/office/drawing/2014/main" id="{1EEB94FC-E965-4EC0-8271-2E60CD393FBF}"/>
+                </a:ext>
+              </a:extLst>
+            </p:cNvPr>
+            <p:cNvGrpSpPr/>
+            <p:nvPr/>
+          </p:nvGrpSpPr>
+          <p:grpSpPr>
+            <a:xfrm>
+              <a:off x="7341875" y="4300977"/>
+              <a:ext cx="509193" cy="509193"/>
+              <a:chOff x="6836849" y="3962545"/>
+              <a:chExt cx="509193" cy="509193"/>
+            </a:xfrm>
+          </p:grpSpPr>
+          <p:pic>
+            <p:nvPicPr>
+              <p:cNvPr id="50" name="Picture 49">
+                <a:extLst>
+                  <a:ext uri="{FF2B5EF4-FFF2-40B4-BE49-F238E27FC236}">
+                    <a16:creationId xmlns:a16="http://schemas.microsoft.com/office/drawing/2014/main" id="{C1B8BDBB-C0EF-4DCC-85A0-C73C5C5D6154}"/>
+                  </a:ext>
+                </a:extLst>
+              </p:cNvPr>
+              <p:cNvPicPr>
+                <a:picLocks noChangeAspect="1"/>
+              </p:cNvPicPr>
+              <p:nvPr/>
+            </p:nvPicPr>
+            <p:blipFill>
+              <a:blip r:embed="rId4">
+                <a:extLst>
+                  <a:ext uri="{28A0092B-C50C-407E-A947-70E740481C1C}">
+                    <a14:useLocalDpi xmlns:a14="http://schemas.microsoft.com/office/drawing/2010/main" val="0"/>
+                  </a:ext>
+                </a:extLst>
+              </a:blip>
+              <a:stretch>
+                <a:fillRect/>
+              </a:stretch>
+            </p:blipFill>
+            <p:spPr>
+              <a:xfrm>
+                <a:off x="6836849" y="3962545"/>
+                <a:ext cx="501501" cy="501501"/>
+              </a:xfrm>
+              <a:prstGeom prst="rect">
+                <a:avLst/>
+              </a:prstGeom>
+            </p:spPr>
+          </p:pic>
+          <p:pic>
+            <p:nvPicPr>
+              <p:cNvPr id="51" name="Picture 50">
+                <a:extLst>
+                  <a:ext uri="{FF2B5EF4-FFF2-40B4-BE49-F238E27FC236}">
+                    <a16:creationId xmlns:a16="http://schemas.microsoft.com/office/drawing/2014/main" id="{A23D99E6-4DE1-4E4B-B595-B5A5CFB3DE78}"/>
+                  </a:ext>
+                </a:extLst>
+              </p:cNvPr>
+              <p:cNvPicPr>
+                <a:picLocks noChangeAspect="1"/>
+              </p:cNvPicPr>
+              <p:nvPr/>
+            </p:nvPicPr>
+            <p:blipFill>
+              <a:blip r:embed="rId5">
+                <a:extLst>
+                  <a:ext uri="{28A0092B-C50C-407E-A947-70E740481C1C}">
+                    <a14:useLocalDpi xmlns:a14="http://schemas.microsoft.com/office/drawing/2010/main" val="0"/>
+                  </a:ext>
+                </a:extLst>
+              </a:blip>
+              <a:stretch>
+                <a:fillRect/>
+              </a:stretch>
+            </p:blipFill>
+            <p:spPr>
+              <a:xfrm>
+                <a:off x="7087599" y="4213295"/>
+                <a:ext cx="258443" cy="258443"/>
+              </a:xfrm>
+              <a:prstGeom prst="rect">
+                <a:avLst/>
+              </a:prstGeom>
+            </p:spPr>
+          </p:pic>
+        </p:grpSp>
+        <p:sp>
+          <p:nvSpPr>
+            <p:cNvPr id="48" name="TextBox 47">
+              <a:extLst>
+                <a:ext uri="{FF2B5EF4-FFF2-40B4-BE49-F238E27FC236}">
+                  <a16:creationId xmlns:a16="http://schemas.microsoft.com/office/drawing/2014/main" id="{454BE231-C867-4FA5-A528-85D76C7A0DED}"/>
+                </a:ext>
+              </a:extLst>
+            </p:cNvPr>
+            <p:cNvSpPr txBox="1"/>
+            <p:nvPr/>
+          </p:nvSpPr>
+          <p:spPr>
+            <a:xfrm>
+              <a:off x="6686490" y="4768063"/>
+              <a:ext cx="1757423" cy="923330"/>
+            </a:xfrm>
+            <a:prstGeom prst="rect">
+              <a:avLst/>
+            </a:prstGeom>
+            <a:noFill/>
+          </p:spPr>
+          <p:txBody>
+            <a:bodyPr wrap="square" rtlCol="0">
+              <a:spAutoFit/>
+            </a:bodyPr>
+            <a:lstStyle/>
+            <a:p>
+              <a:pPr algn="ctr"/>
+              <a:r>
+                <a:rPr lang="en-US" dirty="0"/>
+                <a:t>Machine Learning</a:t>
+              </a:r>
+              <a:br>
+                <a:rPr lang="en-US" dirty="0"/>
+              </a:br>
+              <a:r>
+                <a:rPr lang="en-US" dirty="0"/>
+                <a:t>Services</a:t>
+              </a:r>
+            </a:p>
+          </p:txBody>
+        </p:sp>
+      </p:grpSp>
+      <p:pic>
+        <p:nvPicPr>
+          <p:cNvPr id="4" name="Graphic 3">
+            <a:extLst>
+              <a:ext uri="{FF2B5EF4-FFF2-40B4-BE49-F238E27FC236}">
+                <a16:creationId xmlns:a16="http://schemas.microsoft.com/office/drawing/2014/main" id="{84668113-1C44-464D-AEAE-4A45B5B0FFE3}"/>
+              </a:ext>
+            </a:extLst>
+          </p:cNvPr>
+          <p:cNvPicPr>
+            <a:picLocks noChangeAspect="1"/>
+          </p:cNvPicPr>
+          <p:nvPr/>
+        </p:nvPicPr>
+        <p:blipFill>
+          <a:blip r:embed="rId15">
+            <a:extLst>
+              <a:ext uri="{96DAC541-7B7A-43D3-8B79-37D633B846F1}">
+                <asvg:svgBlip xmlns:asvg="http://schemas.microsoft.com/office/drawing/2016/SVG/main" r:embed="rId16"/>
+              </a:ext>
+            </a:extLst>
+          </a:blip>
+          <a:stretch>
+            <a:fillRect/>
+          </a:stretch>
+        </p:blipFill>
+        <p:spPr>
+          <a:xfrm>
+            <a:off x="3224163" y="4708618"/>
+            <a:ext cx="476250" cy="476250"/>
+          </a:xfrm>
+          <a:prstGeom prst="rect">
+            <a:avLst/>
+          </a:prstGeom>
+        </p:spPr>
+      </p:pic>
+      <p:sp>
+        <p:nvSpPr>
+          <p:cNvPr id="56" name="TextBox 55">
+            <a:extLst>
+              <a:ext uri="{FF2B5EF4-FFF2-40B4-BE49-F238E27FC236}">
+                <a16:creationId xmlns:a16="http://schemas.microsoft.com/office/drawing/2014/main" id="{BFE16701-7683-4D0F-B56A-CCA242B230CC}"/>
+              </a:ext>
+            </a:extLst>
+          </p:cNvPr>
+          <p:cNvSpPr txBox="1"/>
+          <p:nvPr/>
+        </p:nvSpPr>
+        <p:spPr>
+          <a:xfrm>
+            <a:off x="2623169" y="5176627"/>
+            <a:ext cx="1757423" cy="646331"/>
+          </a:xfrm>
+          <a:prstGeom prst="rect">
+            <a:avLst/>
+          </a:prstGeom>
+          <a:noFill/>
+        </p:spPr>
+        <p:txBody>
+          <a:bodyPr wrap="square" rtlCol="0">
+            <a:spAutoFit/>
+          </a:bodyPr>
+          <a:lstStyle/>
+          <a:p>
+            <a:pPr algn="ctr"/>
+            <a:r>
+              <a:rPr lang="en-US" dirty="0"/>
+              <a:t>Azure Data</a:t>
+            </a:r>
+            <a:br>
+              <a:rPr lang="en-US" dirty="0"/>
+            </a:br>
+            <a:r>
+              <a:rPr lang="en-US" dirty="0"/>
+              <a:t>Factory</a:t>
+            </a:r>
+          </a:p>
+        </p:txBody>
+      </p:sp>
     </p:spTree>
     <p:extLst>
       <p:ext uri="{BB962C8B-B14F-4D97-AF65-F5344CB8AC3E}">

</xml_diff>

<commit_message>
Finalizing package for release
</commit_message>
<xml_diff>
--- a/Whiteboard design session/media/diagrams.pptx
+++ b/Whiteboard design session/media/diagrams.pptx
@@ -5,13 +5,14 @@
     <p:sldMasterId id="2147483648" r:id="rId1"/>
   </p:sldMasterIdLst>
   <p:notesMasterIdLst>
-    <p:notesMasterId r:id="rId6"/>
+    <p:notesMasterId r:id="rId7"/>
   </p:notesMasterIdLst>
   <p:sldIdLst>
     <p:sldId id="256" r:id="rId2"/>
     <p:sldId id="257" r:id="rId3"/>
     <p:sldId id="258" r:id="rId4"/>
     <p:sldId id="259" r:id="rId5"/>
+    <p:sldId id="260" r:id="rId6"/>
   </p:sldIdLst>
   <p:sldSz cx="12192000" cy="6858000"/>
   <p:notesSz cx="6858000" cy="9144000"/>
@@ -200,7 +201,7 @@
           <a:p>
             <a:fld id="{90D82B7B-9A37-0949-A600-BA30C7EE531A}" type="datetimeFigureOut">
               <a:rPr lang="en-US" smtClean="0"/>
-              <a:t>6/24/2019</a:t>
+              <a:t>7/8/2019</a:t>
             </a:fld>
             <a:endParaRPr lang="en-US"/>
           </a:p>
@@ -743,6 +744,98 @@
 </p:notes>
 </file>
 
+<file path=ppt/notesSlides/notesSlide4.xml><?xml version="1.0" encoding="utf-8"?>
+<p:notes xmlns:a="http://schemas.openxmlformats.org/drawingml/2006/main" xmlns:r="http://schemas.openxmlformats.org/officeDocument/2006/relationships" xmlns:p="http://schemas.openxmlformats.org/presentationml/2006/main">
+  <p:cSld>
+    <p:spTree>
+      <p:nvGrpSpPr>
+        <p:cNvPr id="1" name=""/>
+        <p:cNvGrpSpPr/>
+        <p:nvPr/>
+      </p:nvGrpSpPr>
+      <p:grpSpPr>
+        <a:xfrm>
+          <a:off x="0" y="0"/>
+          <a:ext cx="0" cy="0"/>
+          <a:chOff x="0" y="0"/>
+          <a:chExt cx="0" cy="0"/>
+        </a:xfrm>
+      </p:grpSpPr>
+      <p:sp>
+        <p:nvSpPr>
+          <p:cNvPr id="2" name="Slide Image Placeholder 1"/>
+          <p:cNvSpPr>
+            <a:spLocks noGrp="1" noRot="1" noChangeAspect="1"/>
+          </p:cNvSpPr>
+          <p:nvPr>
+            <p:ph type="sldImg"/>
+          </p:nvPr>
+        </p:nvSpPr>
+        <p:spPr/>
+      </p:sp>
+      <p:sp>
+        <p:nvSpPr>
+          <p:cNvPr id="3" name="Notes Placeholder 2"/>
+          <p:cNvSpPr>
+            <a:spLocks noGrp="1"/>
+          </p:cNvSpPr>
+          <p:nvPr>
+            <p:ph type="body" idx="1"/>
+          </p:nvPr>
+        </p:nvSpPr>
+        <p:spPr/>
+        <p:txBody>
+          <a:bodyPr/>
+          <a:lstStyle/>
+          <a:p>
+            <a:r>
+              <a:rPr lang="en-US" dirty="0"/>
+              <a:t>SQL Server 2019 Integrated AI and Machine</a:t>
+            </a:r>
+            <a:r>
+              <a:rPr lang="en-US" baseline="0" dirty="0"/>
+              <a:t> Learning</a:t>
+            </a:r>
+            <a:endParaRPr lang="en-US" dirty="0"/>
+          </a:p>
+        </p:txBody>
+      </p:sp>
+      <p:sp>
+        <p:nvSpPr>
+          <p:cNvPr id="4" name="Slide Number Placeholder 3"/>
+          <p:cNvSpPr>
+            <a:spLocks noGrp="1"/>
+          </p:cNvSpPr>
+          <p:nvPr>
+            <p:ph type="sldNum" sz="quarter" idx="10"/>
+          </p:nvPr>
+        </p:nvSpPr>
+        <p:spPr/>
+        <p:txBody>
+          <a:bodyPr/>
+          <a:lstStyle/>
+          <a:p>
+            <a:fld id="{CC0E389C-D2BE-6A4B-8B4B-9E18E21C64A4}" type="slidenum">
+              <a:rPr lang="en-US" smtClean="0"/>
+              <a:t>5</a:t>
+            </a:fld>
+            <a:endParaRPr lang="en-US"/>
+          </a:p>
+        </p:txBody>
+      </p:sp>
+    </p:spTree>
+    <p:extLst>
+      <p:ext uri="{BB962C8B-B14F-4D97-AF65-F5344CB8AC3E}">
+        <p14:creationId xmlns:p14="http://schemas.microsoft.com/office/powerpoint/2010/main" val="4113132480"/>
+      </p:ext>
+    </p:extLst>
+  </p:cSld>
+  <p:clrMapOvr>
+    <a:masterClrMapping/>
+  </p:clrMapOvr>
+</p:notes>
+</file>
+
 <file path=ppt/slideLayouts/slideLayout1.xml><?xml version="1.0" encoding="utf-8"?>
 <p:sldLayout xmlns:a="http://schemas.openxmlformats.org/drawingml/2006/main" xmlns:r="http://schemas.openxmlformats.org/officeDocument/2006/relationships" xmlns:p="http://schemas.openxmlformats.org/presentationml/2006/main" type="title" preserve="1">
   <p:cSld name="Title Slide">
@@ -872,7 +965,7 @@
           <a:p>
             <a:fld id="{232015E6-04D3-AA46-8EB6-5FC99D770932}" type="datetimeFigureOut">
               <a:rPr lang="en-US" smtClean="0"/>
-              <a:t>6/24/2019</a:t>
+              <a:t>7/8/2019</a:t>
             </a:fld>
             <a:endParaRPr lang="en-US"/>
           </a:p>
@@ -1040,7 +1133,7 @@
           <a:p>
             <a:fld id="{232015E6-04D3-AA46-8EB6-5FC99D770932}" type="datetimeFigureOut">
               <a:rPr lang="en-US" smtClean="0"/>
-              <a:t>6/24/2019</a:t>
+              <a:t>7/8/2019</a:t>
             </a:fld>
             <a:endParaRPr lang="en-US"/>
           </a:p>
@@ -1218,7 +1311,7 @@
           <a:p>
             <a:fld id="{232015E6-04D3-AA46-8EB6-5FC99D770932}" type="datetimeFigureOut">
               <a:rPr lang="en-US" smtClean="0"/>
-              <a:t>6/24/2019</a:t>
+              <a:t>7/8/2019</a:t>
             </a:fld>
             <a:endParaRPr lang="en-US"/>
           </a:p>
@@ -1386,7 +1479,7 @@
           <a:p>
             <a:fld id="{232015E6-04D3-AA46-8EB6-5FC99D770932}" type="datetimeFigureOut">
               <a:rPr lang="en-US" smtClean="0"/>
-              <a:t>6/24/2019</a:t>
+              <a:t>7/8/2019</a:t>
             </a:fld>
             <a:endParaRPr lang="en-US"/>
           </a:p>
@@ -1631,7 +1724,7 @@
           <a:p>
             <a:fld id="{232015E6-04D3-AA46-8EB6-5FC99D770932}" type="datetimeFigureOut">
               <a:rPr lang="en-US" smtClean="0"/>
-              <a:t>6/24/2019</a:t>
+              <a:t>7/8/2019</a:t>
             </a:fld>
             <a:endParaRPr lang="en-US"/>
           </a:p>
@@ -1860,7 +1953,7 @@
           <a:p>
             <a:fld id="{232015E6-04D3-AA46-8EB6-5FC99D770932}" type="datetimeFigureOut">
               <a:rPr lang="en-US" smtClean="0"/>
-              <a:t>6/24/2019</a:t>
+              <a:t>7/8/2019</a:t>
             </a:fld>
             <a:endParaRPr lang="en-US"/>
           </a:p>
@@ -2224,7 +2317,7 @@
           <a:p>
             <a:fld id="{232015E6-04D3-AA46-8EB6-5FC99D770932}" type="datetimeFigureOut">
               <a:rPr lang="en-US" smtClean="0"/>
-              <a:t>6/24/2019</a:t>
+              <a:t>7/8/2019</a:t>
             </a:fld>
             <a:endParaRPr lang="en-US"/>
           </a:p>
@@ -2341,7 +2434,7 @@
           <a:p>
             <a:fld id="{232015E6-04D3-AA46-8EB6-5FC99D770932}" type="datetimeFigureOut">
               <a:rPr lang="en-US" smtClean="0"/>
-              <a:t>6/24/2019</a:t>
+              <a:t>7/8/2019</a:t>
             </a:fld>
             <a:endParaRPr lang="en-US"/>
           </a:p>
@@ -2436,7 +2529,7 @@
           <a:p>
             <a:fld id="{232015E6-04D3-AA46-8EB6-5FC99D770932}" type="datetimeFigureOut">
               <a:rPr lang="en-US" smtClean="0"/>
-              <a:t>6/24/2019</a:t>
+              <a:t>7/8/2019</a:t>
             </a:fld>
             <a:endParaRPr lang="en-US"/>
           </a:p>
@@ -2711,7 +2804,7 @@
           <a:p>
             <a:fld id="{232015E6-04D3-AA46-8EB6-5FC99D770932}" type="datetimeFigureOut">
               <a:rPr lang="en-US" smtClean="0"/>
-              <a:t>6/24/2019</a:t>
+              <a:t>7/8/2019</a:t>
             </a:fld>
             <a:endParaRPr lang="en-US"/>
           </a:p>
@@ -2963,7 +3056,7 @@
           <a:p>
             <a:fld id="{232015E6-04D3-AA46-8EB6-5FC99D770932}" type="datetimeFigureOut">
               <a:rPr lang="en-US" smtClean="0"/>
-              <a:t>6/24/2019</a:t>
+              <a:t>7/8/2019</a:t>
             </a:fld>
             <a:endParaRPr lang="en-US"/>
           </a:p>
@@ -3174,7 +3267,7 @@
           <a:p>
             <a:fld id="{232015E6-04D3-AA46-8EB6-5FC99D770932}" type="datetimeFigureOut">
               <a:rPr lang="en-US" smtClean="0"/>
-              <a:t>6/24/2019</a:t>
+              <a:t>7/8/2019</a:t>
             </a:fld>
             <a:endParaRPr lang="en-US"/>
           </a:p>
@@ -12740,6 +12833,1517 @@
 </p:sld>
 </file>
 
+<file path=ppt/slides/slide5.xml><?xml version="1.0" encoding="utf-8"?>
+<p:sld xmlns:a="http://schemas.openxmlformats.org/drawingml/2006/main" xmlns:r="http://schemas.openxmlformats.org/officeDocument/2006/relationships" xmlns:p="http://schemas.openxmlformats.org/presentationml/2006/main">
+  <p:cSld>
+    <p:spTree>
+      <p:nvGrpSpPr>
+        <p:cNvPr id="1" name=""/>
+        <p:cNvGrpSpPr/>
+        <p:nvPr/>
+      </p:nvGrpSpPr>
+      <p:grpSpPr>
+        <a:xfrm>
+          <a:off x="0" y="0"/>
+          <a:ext cx="0" cy="0"/>
+          <a:chOff x="0" y="0"/>
+          <a:chExt cx="0" cy="0"/>
+        </a:xfrm>
+      </p:grpSpPr>
+      <p:sp>
+        <p:nvSpPr>
+          <p:cNvPr id="5" name="Rectangle 4"/>
+          <p:cNvSpPr/>
+          <p:nvPr/>
+        </p:nvSpPr>
+        <p:spPr>
+          <a:xfrm>
+            <a:off x="2623169" y="1948131"/>
+            <a:ext cx="1620456" cy="4016415"/>
+          </a:xfrm>
+          <a:prstGeom prst="rect">
+            <a:avLst/>
+          </a:prstGeom>
+          <a:solidFill>
+            <a:schemeClr val="bg2"/>
+          </a:solidFill>
+          <a:ln w="38100">
+            <a:solidFill>
+              <a:schemeClr val="tx1"/>
+            </a:solidFill>
+          </a:ln>
+        </p:spPr>
+        <p:style>
+          <a:lnRef idx="2">
+            <a:schemeClr val="accent1">
+              <a:shade val="50000"/>
+            </a:schemeClr>
+          </a:lnRef>
+          <a:fillRef idx="1">
+            <a:schemeClr val="accent1"/>
+          </a:fillRef>
+          <a:effectRef idx="0">
+            <a:schemeClr val="accent1"/>
+          </a:effectRef>
+          <a:fontRef idx="minor">
+            <a:schemeClr val="lt1"/>
+          </a:fontRef>
+        </p:style>
+        <p:txBody>
+          <a:bodyPr rtlCol="0" anchor="ctr"/>
+          <a:lstStyle/>
+          <a:p>
+            <a:pPr algn="ctr"/>
+            <a:endParaRPr lang="en-US"/>
+          </a:p>
+        </p:txBody>
+      </p:sp>
+      <p:sp>
+        <p:nvSpPr>
+          <p:cNvPr id="6" name="Rectangle 5"/>
+          <p:cNvSpPr/>
+          <p:nvPr/>
+        </p:nvSpPr>
+        <p:spPr>
+          <a:xfrm>
+            <a:off x="4696967" y="1948130"/>
+            <a:ext cx="1620456" cy="4016415"/>
+          </a:xfrm>
+          <a:prstGeom prst="rect">
+            <a:avLst/>
+          </a:prstGeom>
+          <a:solidFill>
+            <a:schemeClr val="bg2"/>
+          </a:solidFill>
+          <a:ln w="38100">
+            <a:solidFill>
+              <a:schemeClr val="tx1"/>
+            </a:solidFill>
+          </a:ln>
+        </p:spPr>
+        <p:style>
+          <a:lnRef idx="2">
+            <a:schemeClr val="accent1">
+              <a:shade val="50000"/>
+            </a:schemeClr>
+          </a:lnRef>
+          <a:fillRef idx="1">
+            <a:schemeClr val="accent1"/>
+          </a:fillRef>
+          <a:effectRef idx="0">
+            <a:schemeClr val="accent1"/>
+          </a:effectRef>
+          <a:fontRef idx="minor">
+            <a:schemeClr val="lt1"/>
+          </a:fontRef>
+        </p:style>
+        <p:txBody>
+          <a:bodyPr rtlCol="0" anchor="ctr"/>
+          <a:lstStyle/>
+          <a:p>
+            <a:pPr algn="ctr"/>
+            <a:endParaRPr lang="en-US"/>
+          </a:p>
+        </p:txBody>
+      </p:sp>
+      <p:sp>
+        <p:nvSpPr>
+          <p:cNvPr id="7" name="Rectangle 6"/>
+          <p:cNvSpPr/>
+          <p:nvPr/>
+        </p:nvSpPr>
+        <p:spPr>
+          <a:xfrm>
+            <a:off x="6770765" y="1948131"/>
+            <a:ext cx="1620456" cy="4016415"/>
+          </a:xfrm>
+          <a:prstGeom prst="rect">
+            <a:avLst/>
+          </a:prstGeom>
+          <a:solidFill>
+            <a:schemeClr val="bg2"/>
+          </a:solidFill>
+          <a:ln w="38100">
+            <a:solidFill>
+              <a:schemeClr val="tx1"/>
+            </a:solidFill>
+          </a:ln>
+        </p:spPr>
+        <p:style>
+          <a:lnRef idx="2">
+            <a:schemeClr val="accent1">
+              <a:shade val="50000"/>
+            </a:schemeClr>
+          </a:lnRef>
+          <a:fillRef idx="1">
+            <a:schemeClr val="accent1"/>
+          </a:fillRef>
+          <a:effectRef idx="0">
+            <a:schemeClr val="accent1"/>
+          </a:effectRef>
+          <a:fontRef idx="minor">
+            <a:schemeClr val="lt1"/>
+          </a:fontRef>
+        </p:style>
+        <p:txBody>
+          <a:bodyPr rtlCol="0" anchor="ctr"/>
+          <a:lstStyle/>
+          <a:p>
+            <a:pPr algn="ctr"/>
+            <a:endParaRPr lang="en-US"/>
+          </a:p>
+        </p:txBody>
+      </p:sp>
+      <p:sp>
+        <p:nvSpPr>
+          <p:cNvPr id="8" name="Rectangle 7"/>
+          <p:cNvSpPr/>
+          <p:nvPr/>
+        </p:nvSpPr>
+        <p:spPr>
+          <a:xfrm>
+            <a:off x="8844563" y="1948131"/>
+            <a:ext cx="1620456" cy="4016415"/>
+          </a:xfrm>
+          <a:prstGeom prst="rect">
+            <a:avLst/>
+          </a:prstGeom>
+          <a:solidFill>
+            <a:schemeClr val="bg2"/>
+          </a:solidFill>
+          <a:ln w="38100">
+            <a:solidFill>
+              <a:schemeClr val="tx1"/>
+            </a:solidFill>
+          </a:ln>
+        </p:spPr>
+        <p:style>
+          <a:lnRef idx="2">
+            <a:schemeClr val="accent1">
+              <a:shade val="50000"/>
+            </a:schemeClr>
+          </a:lnRef>
+          <a:fillRef idx="1">
+            <a:schemeClr val="accent1"/>
+          </a:fillRef>
+          <a:effectRef idx="0">
+            <a:schemeClr val="accent1"/>
+          </a:effectRef>
+          <a:fontRef idx="minor">
+            <a:schemeClr val="lt1"/>
+          </a:fontRef>
+        </p:style>
+        <p:txBody>
+          <a:bodyPr rtlCol="0" anchor="ctr"/>
+          <a:lstStyle/>
+          <a:p>
+            <a:pPr algn="ctr"/>
+            <a:endParaRPr lang="en-US"/>
+          </a:p>
+        </p:txBody>
+      </p:sp>
+      <p:sp>
+        <p:nvSpPr>
+          <p:cNvPr id="10" name="TextBox 9"/>
+          <p:cNvSpPr txBox="1"/>
+          <p:nvPr/>
+        </p:nvSpPr>
+        <p:spPr>
+          <a:xfrm>
+            <a:off x="2967667" y="2094128"/>
+            <a:ext cx="949124" cy="461665"/>
+          </a:xfrm>
+          <a:prstGeom prst="rect">
+            <a:avLst/>
+          </a:prstGeom>
+          <a:noFill/>
+        </p:spPr>
+        <p:txBody>
+          <a:bodyPr wrap="square" rtlCol="0">
+            <a:spAutoFit/>
+          </a:bodyPr>
+          <a:lstStyle/>
+          <a:p>
+            <a:pPr algn="ctr"/>
+            <a:r>
+              <a:rPr lang="en-US" sz="2400" dirty="0"/>
+              <a:t>Ingest</a:t>
+            </a:r>
+          </a:p>
+        </p:txBody>
+      </p:sp>
+      <p:sp>
+        <p:nvSpPr>
+          <p:cNvPr id="11" name="TextBox 10"/>
+          <p:cNvSpPr txBox="1"/>
+          <p:nvPr/>
+        </p:nvSpPr>
+        <p:spPr>
+          <a:xfrm>
+            <a:off x="5041465" y="2094128"/>
+            <a:ext cx="949124" cy="461665"/>
+          </a:xfrm>
+          <a:prstGeom prst="rect">
+            <a:avLst/>
+          </a:prstGeom>
+          <a:noFill/>
+        </p:spPr>
+        <p:txBody>
+          <a:bodyPr wrap="square" rtlCol="0">
+            <a:spAutoFit/>
+          </a:bodyPr>
+          <a:lstStyle/>
+          <a:p>
+            <a:pPr algn="ctr"/>
+            <a:r>
+              <a:rPr lang="en-US" sz="2400" dirty="0"/>
+              <a:t>Store</a:t>
+            </a:r>
+          </a:p>
+        </p:txBody>
+      </p:sp>
+      <p:sp>
+        <p:nvSpPr>
+          <p:cNvPr id="12" name="TextBox 11"/>
+          <p:cNvSpPr txBox="1"/>
+          <p:nvPr/>
+        </p:nvSpPr>
+        <p:spPr>
+          <a:xfrm>
+            <a:off x="6736708" y="2087031"/>
+            <a:ext cx="1812400" cy="461665"/>
+          </a:xfrm>
+          <a:prstGeom prst="rect">
+            <a:avLst/>
+          </a:prstGeom>
+          <a:noFill/>
+        </p:spPr>
+        <p:txBody>
+          <a:bodyPr wrap="square" rtlCol="0">
+            <a:spAutoFit/>
+          </a:bodyPr>
+          <a:lstStyle/>
+          <a:p>
+            <a:r>
+              <a:rPr lang="en-US" sz="2400" dirty="0"/>
+              <a:t>Prep &amp; train</a:t>
+            </a:r>
+          </a:p>
+        </p:txBody>
+      </p:sp>
+      <p:sp>
+        <p:nvSpPr>
+          <p:cNvPr id="13" name="TextBox 12"/>
+          <p:cNvSpPr txBox="1"/>
+          <p:nvPr/>
+        </p:nvSpPr>
+        <p:spPr>
+          <a:xfrm>
+            <a:off x="8830726" y="2087031"/>
+            <a:ext cx="1620456" cy="830997"/>
+          </a:xfrm>
+          <a:prstGeom prst="rect">
+            <a:avLst/>
+          </a:prstGeom>
+          <a:noFill/>
+        </p:spPr>
+        <p:txBody>
+          <a:bodyPr wrap="square" rtlCol="0">
+            <a:spAutoFit/>
+          </a:bodyPr>
+          <a:lstStyle/>
+          <a:p>
+            <a:pPr algn="ctr"/>
+            <a:r>
+              <a:rPr lang="en-US" sz="2400" dirty="0"/>
+              <a:t>Model &amp;</a:t>
+            </a:r>
+          </a:p>
+          <a:p>
+            <a:pPr algn="ctr"/>
+            <a:r>
+              <a:rPr lang="en-US" sz="2400" dirty="0"/>
+              <a:t>serve</a:t>
+            </a:r>
+          </a:p>
+        </p:txBody>
+      </p:sp>
+      <p:pic>
+        <p:nvPicPr>
+          <p:cNvPr id="14" name="Picture 13"/>
+          <p:cNvPicPr>
+            <a:picLocks noChangeAspect="1"/>
+          </p:cNvPicPr>
+          <p:nvPr/>
+        </p:nvPicPr>
+        <p:blipFill>
+          <a:blip r:embed="rId3">
+            <a:extLst>
+              <a:ext uri="{28A0092B-C50C-407E-A947-70E740481C1C}">
+                <a14:useLocalDpi xmlns:a14="http://schemas.microsoft.com/office/drawing/2010/main" val="0"/>
+              </a:ext>
+            </a:extLst>
+          </a:blip>
+          <a:stretch>
+            <a:fillRect/>
+          </a:stretch>
+        </p:blipFill>
+        <p:spPr>
+          <a:xfrm>
+            <a:off x="4873430" y="2687596"/>
+            <a:ext cx="418006" cy="418006"/>
+          </a:xfrm>
+          <a:prstGeom prst="rect">
+            <a:avLst/>
+          </a:prstGeom>
+        </p:spPr>
+      </p:pic>
+      <p:pic>
+        <p:nvPicPr>
+          <p:cNvPr id="15" name="Picture 14"/>
+          <p:cNvPicPr>
+            <a:picLocks noChangeAspect="1"/>
+          </p:cNvPicPr>
+          <p:nvPr/>
+        </p:nvPicPr>
+        <p:blipFill>
+          <a:blip r:embed="rId3">
+            <a:extLst>
+              <a:ext uri="{28A0092B-C50C-407E-A947-70E740481C1C}">
+                <a14:useLocalDpi xmlns:a14="http://schemas.microsoft.com/office/drawing/2010/main" val="0"/>
+              </a:ext>
+            </a:extLst>
+          </a:blip>
+          <a:stretch>
+            <a:fillRect/>
+          </a:stretch>
+        </p:blipFill>
+        <p:spPr>
+          <a:xfrm>
+            <a:off x="5288366" y="2687596"/>
+            <a:ext cx="418006" cy="418006"/>
+          </a:xfrm>
+          <a:prstGeom prst="rect">
+            <a:avLst/>
+          </a:prstGeom>
+        </p:spPr>
+      </p:pic>
+      <p:pic>
+        <p:nvPicPr>
+          <p:cNvPr id="16" name="Picture 15"/>
+          <p:cNvPicPr>
+            <a:picLocks noChangeAspect="1"/>
+          </p:cNvPicPr>
+          <p:nvPr/>
+        </p:nvPicPr>
+        <p:blipFill>
+          <a:blip r:embed="rId3">
+            <a:extLst>
+              <a:ext uri="{28A0092B-C50C-407E-A947-70E740481C1C}">
+                <a14:useLocalDpi xmlns:a14="http://schemas.microsoft.com/office/drawing/2010/main" val="0"/>
+              </a:ext>
+            </a:extLst>
+          </a:blip>
+          <a:stretch>
+            <a:fillRect/>
+          </a:stretch>
+        </p:blipFill>
+        <p:spPr>
+          <a:xfrm>
+            <a:off x="5706372" y="2687596"/>
+            <a:ext cx="418006" cy="418006"/>
+          </a:xfrm>
+          <a:prstGeom prst="rect">
+            <a:avLst/>
+          </a:prstGeom>
+        </p:spPr>
+      </p:pic>
+      <p:sp>
+        <p:nvSpPr>
+          <p:cNvPr id="24" name="TextBox 23"/>
+          <p:cNvSpPr txBox="1"/>
+          <p:nvPr/>
+        </p:nvSpPr>
+        <p:spPr>
+          <a:xfrm>
+            <a:off x="4689275" y="3137219"/>
+            <a:ext cx="1628148" cy="1015663"/>
+          </a:xfrm>
+          <a:prstGeom prst="rect">
+            <a:avLst/>
+          </a:prstGeom>
+          <a:noFill/>
+        </p:spPr>
+        <p:txBody>
+          <a:bodyPr wrap="square" rtlCol="0">
+            <a:spAutoFit/>
+          </a:bodyPr>
+          <a:lstStyle/>
+          <a:p>
+            <a:pPr algn="ctr"/>
+            <a:r>
+              <a:rPr lang="en-US" sz="2000" dirty="0"/>
+              <a:t>Database</a:t>
+            </a:r>
+          </a:p>
+          <a:p>
+            <a:pPr algn="ctr"/>
+            <a:r>
+              <a:rPr lang="en-US" sz="2000" dirty="0"/>
+              <a:t>cluster or pool</a:t>
+            </a:r>
+          </a:p>
+        </p:txBody>
+      </p:sp>
+      <p:sp>
+        <p:nvSpPr>
+          <p:cNvPr id="25" name="TextBox 24"/>
+          <p:cNvSpPr txBox="1"/>
+          <p:nvPr/>
+        </p:nvSpPr>
+        <p:spPr>
+          <a:xfrm>
+            <a:off x="5150957" y="5116114"/>
+            <a:ext cx="949124" cy="400110"/>
+          </a:xfrm>
+          <a:prstGeom prst="rect">
+            <a:avLst/>
+          </a:prstGeom>
+          <a:noFill/>
+        </p:spPr>
+        <p:txBody>
+          <a:bodyPr wrap="square" rtlCol="0">
+            <a:spAutoFit/>
+          </a:bodyPr>
+          <a:lstStyle/>
+          <a:p>
+            <a:r>
+              <a:rPr lang="en-US" sz="2000" dirty="0"/>
+              <a:t>HDFS</a:t>
+            </a:r>
+          </a:p>
+        </p:txBody>
+      </p:sp>
+      <p:pic>
+        <p:nvPicPr>
+          <p:cNvPr id="29" name="Picture 28"/>
+          <p:cNvPicPr>
+            <a:picLocks noChangeAspect="1"/>
+          </p:cNvPicPr>
+          <p:nvPr/>
+        </p:nvPicPr>
+        <p:blipFill>
+          <a:blip r:embed="rId4">
+            <a:clrChange>
+              <a:clrFrom>
+                <a:srgbClr val="F8F8F8"/>
+              </a:clrFrom>
+              <a:clrTo>
+                <a:srgbClr val="F8F8F8">
+                  <a:alpha val="0"/>
+                </a:srgbClr>
+              </a:clrTo>
+            </a:clrChange>
+          </a:blip>
+          <a:stretch>
+            <a:fillRect/>
+          </a:stretch>
+        </p:blipFill>
+        <p:spPr>
+          <a:xfrm>
+            <a:off x="2710669" y="2597750"/>
+            <a:ext cx="1469002" cy="1343981"/>
+          </a:xfrm>
+          <a:prstGeom prst="rect">
+            <a:avLst/>
+          </a:prstGeom>
+        </p:spPr>
+      </p:pic>
+      <p:sp>
+        <p:nvSpPr>
+          <p:cNvPr id="30" name="TextBox 29"/>
+          <p:cNvSpPr txBox="1"/>
+          <p:nvPr/>
+        </p:nvSpPr>
+        <p:spPr>
+          <a:xfrm>
+            <a:off x="2970608" y="3922049"/>
+            <a:ext cx="949124" cy="461665"/>
+          </a:xfrm>
+          <a:prstGeom prst="rect">
+            <a:avLst/>
+          </a:prstGeom>
+          <a:noFill/>
+        </p:spPr>
+        <p:txBody>
+          <a:bodyPr wrap="square" rtlCol="0">
+            <a:spAutoFit/>
+          </a:bodyPr>
+          <a:lstStyle/>
+          <a:p>
+            <a:r>
+              <a:rPr lang="en-US" sz="2400" dirty="0"/>
+              <a:t>Kafka</a:t>
+            </a:r>
+          </a:p>
+        </p:txBody>
+      </p:sp>
+      <p:pic>
+        <p:nvPicPr>
+          <p:cNvPr id="31" name="Picture 30"/>
+          <p:cNvPicPr>
+            <a:picLocks noChangeAspect="1"/>
+          </p:cNvPicPr>
+          <p:nvPr/>
+        </p:nvPicPr>
+        <p:blipFill>
+          <a:blip r:embed="rId5">
+            <a:biLevel thresh="75000"/>
+            <a:extLst>
+              <a:ext uri="{28A0092B-C50C-407E-A947-70E740481C1C}">
+                <a14:useLocalDpi xmlns:a14="http://schemas.microsoft.com/office/drawing/2010/main" val="0"/>
+              </a:ext>
+            </a:extLst>
+          </a:blip>
+          <a:stretch>
+            <a:fillRect/>
+          </a:stretch>
+        </p:blipFill>
+        <p:spPr>
+          <a:xfrm>
+            <a:off x="681214" y="1221775"/>
+            <a:ext cx="577862" cy="577862"/>
+          </a:xfrm>
+          <a:prstGeom prst="rect">
+            <a:avLst/>
+          </a:prstGeom>
+        </p:spPr>
+      </p:pic>
+      <p:pic>
+        <p:nvPicPr>
+          <p:cNvPr id="32" name="Picture 31"/>
+          <p:cNvPicPr>
+            <a:picLocks noChangeAspect="1"/>
+          </p:cNvPicPr>
+          <p:nvPr/>
+        </p:nvPicPr>
+        <p:blipFill>
+          <a:blip r:embed="rId6">
+            <a:biLevel thresh="75000"/>
+            <a:extLst>
+              <a:ext uri="{28A0092B-C50C-407E-A947-70E740481C1C}">
+                <a14:useLocalDpi xmlns:a14="http://schemas.microsoft.com/office/drawing/2010/main" val="0"/>
+              </a:ext>
+            </a:extLst>
+          </a:blip>
+          <a:stretch>
+            <a:fillRect/>
+          </a:stretch>
+        </p:blipFill>
+        <p:spPr>
+          <a:xfrm>
+            <a:off x="5120408" y="4406996"/>
+            <a:ext cx="780288" cy="780288"/>
+          </a:xfrm>
+          <a:prstGeom prst="rect">
+            <a:avLst/>
+          </a:prstGeom>
+        </p:spPr>
+      </p:pic>
+      <p:pic>
+        <p:nvPicPr>
+          <p:cNvPr id="33" name="Picture 32"/>
+          <p:cNvPicPr>
+            <a:picLocks noChangeAspect="1"/>
+          </p:cNvPicPr>
+          <p:nvPr/>
+        </p:nvPicPr>
+        <p:blipFill>
+          <a:blip r:embed="rId7">
+            <a:biLevel thresh="75000"/>
+            <a:extLst>
+              <a:ext uri="{28A0092B-C50C-407E-A947-70E740481C1C}">
+                <a14:useLocalDpi xmlns:a14="http://schemas.microsoft.com/office/drawing/2010/main" val="0"/>
+              </a:ext>
+            </a:extLst>
+          </a:blip>
+          <a:stretch>
+            <a:fillRect/>
+          </a:stretch>
+        </p:blipFill>
+        <p:spPr>
+          <a:xfrm>
+            <a:off x="698587" y="5014448"/>
+            <a:ext cx="543113" cy="543113"/>
+          </a:xfrm>
+          <a:prstGeom prst="rect">
+            <a:avLst/>
+          </a:prstGeom>
+        </p:spPr>
+      </p:pic>
+      <p:grpSp>
+        <p:nvGrpSpPr>
+          <p:cNvPr id="37" name="Group 36"/>
+          <p:cNvGrpSpPr/>
+          <p:nvPr/>
+        </p:nvGrpSpPr>
+        <p:grpSpPr>
+          <a:xfrm>
+            <a:off x="795836" y="2992506"/>
+            <a:ext cx="348618" cy="822294"/>
+            <a:chOff x="732847" y="2372810"/>
+            <a:chExt cx="488701" cy="1152711"/>
+          </a:xfrm>
+        </p:grpSpPr>
+        <p:pic>
+          <p:nvPicPr>
+            <p:cNvPr id="34" name="Picture 33"/>
+            <p:cNvPicPr>
+              <a:picLocks noChangeAspect="1"/>
+            </p:cNvPicPr>
+            <p:nvPr/>
+          </p:nvPicPr>
+          <p:blipFill>
+            <a:blip r:embed="rId8">
+              <a:biLevel thresh="75000"/>
+              <a:extLst>
+                <a:ext uri="{28A0092B-C50C-407E-A947-70E740481C1C}">
+                  <a14:useLocalDpi xmlns:a14="http://schemas.microsoft.com/office/drawing/2010/main" val="0"/>
+                </a:ext>
+              </a:extLst>
+            </a:blip>
+            <a:stretch>
+              <a:fillRect/>
+            </a:stretch>
+          </p:blipFill>
+          <p:spPr>
+            <a:xfrm>
+              <a:off x="732847" y="2372810"/>
+              <a:ext cx="488701" cy="1152711"/>
+            </a:xfrm>
+            <a:prstGeom prst="rect">
+              <a:avLst/>
+            </a:prstGeom>
+          </p:spPr>
+        </p:pic>
+        <p:pic>
+          <p:nvPicPr>
+            <p:cNvPr id="36" name="Picture 35"/>
+            <p:cNvPicPr>
+              <a:picLocks noChangeAspect="1"/>
+            </p:cNvPicPr>
+            <p:nvPr/>
+          </p:nvPicPr>
+          <p:blipFill>
+            <a:blip r:embed="rId9">
+              <a:biLevel thresh="75000"/>
+              <a:extLst>
+                <a:ext uri="{28A0092B-C50C-407E-A947-70E740481C1C}">
+                  <a14:useLocalDpi xmlns:a14="http://schemas.microsoft.com/office/drawing/2010/main" val="0"/>
+                </a:ext>
+              </a:extLst>
+            </a:blip>
+            <a:stretch>
+              <a:fillRect/>
+            </a:stretch>
+          </p:blipFill>
+          <p:spPr>
+            <a:xfrm>
+              <a:off x="789477" y="2761445"/>
+              <a:ext cx="375439" cy="375439"/>
+            </a:xfrm>
+            <a:prstGeom prst="rect">
+              <a:avLst/>
+            </a:prstGeom>
+          </p:spPr>
+        </p:pic>
+      </p:grpSp>
+      <p:sp>
+        <p:nvSpPr>
+          <p:cNvPr id="38" name="TextBox 37"/>
+          <p:cNvSpPr txBox="1"/>
+          <p:nvPr/>
+        </p:nvSpPr>
+        <p:spPr>
+          <a:xfrm>
+            <a:off x="92078" y="1796043"/>
+            <a:ext cx="1736290" cy="1015663"/>
+          </a:xfrm>
+          <a:prstGeom prst="rect">
+            <a:avLst/>
+          </a:prstGeom>
+          <a:noFill/>
+        </p:spPr>
+        <p:txBody>
+          <a:bodyPr wrap="square" rtlCol="0">
+            <a:spAutoFit/>
+          </a:bodyPr>
+          <a:lstStyle/>
+          <a:p>
+            <a:pPr algn="ctr"/>
+            <a:r>
+              <a:rPr lang="en-US" sz="2000" dirty="0"/>
+              <a:t>Logs, files</a:t>
+            </a:r>
+          </a:p>
+          <a:p>
+            <a:pPr algn="ctr"/>
+            <a:r>
+              <a:rPr lang="en-US" sz="2000" dirty="0"/>
+              <a:t>and media</a:t>
+            </a:r>
+          </a:p>
+          <a:p>
+            <a:pPr algn="ctr"/>
+            <a:r>
+              <a:rPr lang="en-US" sz="2000" dirty="0"/>
+              <a:t>(unstructured)</a:t>
+            </a:r>
+          </a:p>
+        </p:txBody>
+      </p:sp>
+      <p:sp>
+        <p:nvSpPr>
+          <p:cNvPr id="39" name="TextBox 38"/>
+          <p:cNvSpPr txBox="1"/>
+          <p:nvPr/>
+        </p:nvSpPr>
+        <p:spPr>
+          <a:xfrm>
+            <a:off x="92078" y="3701351"/>
+            <a:ext cx="1817065" cy="707886"/>
+          </a:xfrm>
+          <a:prstGeom prst="rect">
+            <a:avLst/>
+          </a:prstGeom>
+          <a:noFill/>
+        </p:spPr>
+        <p:txBody>
+          <a:bodyPr wrap="square" rtlCol="0">
+            <a:spAutoFit/>
+          </a:bodyPr>
+          <a:lstStyle/>
+          <a:p>
+            <a:pPr algn="ctr"/>
+            <a:r>
+              <a:rPr lang="en-US" sz="2000" dirty="0"/>
+              <a:t>Sensors and IoT</a:t>
+            </a:r>
+          </a:p>
+          <a:p>
+            <a:pPr algn="ctr"/>
+            <a:r>
+              <a:rPr lang="en-US" sz="2000" dirty="0"/>
+              <a:t>(unstructured)</a:t>
+            </a:r>
+          </a:p>
+        </p:txBody>
+      </p:sp>
+      <p:sp>
+        <p:nvSpPr>
+          <p:cNvPr id="40" name="TextBox 39"/>
+          <p:cNvSpPr txBox="1"/>
+          <p:nvPr/>
+        </p:nvSpPr>
+        <p:spPr>
+          <a:xfrm>
+            <a:off x="92078" y="5476113"/>
+            <a:ext cx="1721886" cy="1015663"/>
+          </a:xfrm>
+          <a:prstGeom prst="rect">
+            <a:avLst/>
+          </a:prstGeom>
+          <a:noFill/>
+        </p:spPr>
+        <p:txBody>
+          <a:bodyPr wrap="square" rtlCol="0">
+            <a:spAutoFit/>
+          </a:bodyPr>
+          <a:lstStyle/>
+          <a:p>
+            <a:pPr algn="ctr"/>
+            <a:r>
+              <a:rPr lang="en-US" sz="2000" dirty="0"/>
+              <a:t>Business /</a:t>
+            </a:r>
+            <a:br>
+              <a:rPr lang="en-US" sz="2000" dirty="0"/>
+            </a:br>
+            <a:r>
+              <a:rPr lang="en-US" sz="2000" dirty="0"/>
+              <a:t>custom apps</a:t>
+            </a:r>
+          </a:p>
+          <a:p>
+            <a:pPr algn="ctr"/>
+            <a:r>
+              <a:rPr lang="en-US" sz="2000" dirty="0"/>
+              <a:t>(structured)</a:t>
+            </a:r>
+          </a:p>
+        </p:txBody>
+      </p:sp>
+      <p:cxnSp>
+        <p:nvCxnSpPr>
+          <p:cNvPr id="41" name="Straight Arrow Connector 40"/>
+          <p:cNvCxnSpPr>
+            <a:cxnSpLocks/>
+          </p:cNvCxnSpPr>
+          <p:nvPr/>
+        </p:nvCxnSpPr>
+        <p:spPr>
+          <a:xfrm>
+            <a:off x="2207802" y="2548696"/>
+            <a:ext cx="523687" cy="0"/>
+          </a:xfrm>
+          <a:prstGeom prst="straightConnector1">
+            <a:avLst/>
+          </a:prstGeom>
+          <a:ln w="101600">
+            <a:solidFill>
+              <a:srgbClr val="0070C0"/>
+            </a:solidFill>
+            <a:tailEnd type="triangle"/>
+          </a:ln>
+        </p:spPr>
+        <p:style>
+          <a:lnRef idx="1">
+            <a:schemeClr val="accent1"/>
+          </a:lnRef>
+          <a:fillRef idx="0">
+            <a:schemeClr val="accent1"/>
+          </a:fillRef>
+          <a:effectRef idx="0">
+            <a:schemeClr val="accent1"/>
+          </a:effectRef>
+          <a:fontRef idx="minor">
+            <a:schemeClr val="tx1"/>
+          </a:fontRef>
+        </p:style>
+      </p:cxnSp>
+      <p:cxnSp>
+        <p:nvCxnSpPr>
+          <p:cNvPr id="43" name="Straight Connector 42"/>
+          <p:cNvCxnSpPr/>
+          <p:nvPr/>
+        </p:nvCxnSpPr>
+        <p:spPr>
+          <a:xfrm flipH="1" flipV="1">
+            <a:off x="2197127" y="1081077"/>
+            <a:ext cx="6757" cy="3519161"/>
+          </a:xfrm>
+          <a:prstGeom prst="line">
+            <a:avLst/>
+          </a:prstGeom>
+          <a:ln w="101600">
+            <a:solidFill>
+              <a:srgbClr val="0070C0"/>
+            </a:solidFill>
+          </a:ln>
+        </p:spPr>
+        <p:style>
+          <a:lnRef idx="1">
+            <a:schemeClr val="accent1"/>
+          </a:lnRef>
+          <a:fillRef idx="0">
+            <a:schemeClr val="accent1"/>
+          </a:fillRef>
+          <a:effectRef idx="0">
+            <a:schemeClr val="accent1"/>
+          </a:effectRef>
+          <a:fontRef idx="minor">
+            <a:schemeClr val="tx1"/>
+          </a:fontRef>
+        </p:style>
+      </p:cxnSp>
+      <p:cxnSp>
+        <p:nvCxnSpPr>
+          <p:cNvPr id="44" name="Straight Connector 43"/>
+          <p:cNvCxnSpPr/>
+          <p:nvPr/>
+        </p:nvCxnSpPr>
+        <p:spPr>
+          <a:xfrm flipH="1" flipV="1">
+            <a:off x="1813963" y="1081077"/>
+            <a:ext cx="433563" cy="10092"/>
+          </a:xfrm>
+          <a:prstGeom prst="line">
+            <a:avLst/>
+          </a:prstGeom>
+          <a:ln w="101600">
+            <a:solidFill>
+              <a:srgbClr val="0070C0"/>
+            </a:solidFill>
+          </a:ln>
+        </p:spPr>
+        <p:style>
+          <a:lnRef idx="1">
+            <a:schemeClr val="accent1"/>
+          </a:lnRef>
+          <a:fillRef idx="0">
+            <a:schemeClr val="accent1"/>
+          </a:fillRef>
+          <a:effectRef idx="0">
+            <a:schemeClr val="accent1"/>
+          </a:effectRef>
+          <a:fontRef idx="minor">
+            <a:schemeClr val="tx1"/>
+          </a:fontRef>
+        </p:style>
+      </p:cxnSp>
+      <p:cxnSp>
+        <p:nvCxnSpPr>
+          <p:cNvPr id="49" name="Straight Connector 48"/>
+          <p:cNvCxnSpPr>
+            <a:cxnSpLocks/>
+          </p:cNvCxnSpPr>
+          <p:nvPr/>
+        </p:nvCxnSpPr>
+        <p:spPr>
+          <a:xfrm flipH="1" flipV="1">
+            <a:off x="1828368" y="4566772"/>
+            <a:ext cx="405563" cy="6253"/>
+          </a:xfrm>
+          <a:prstGeom prst="line">
+            <a:avLst/>
+          </a:prstGeom>
+          <a:ln w="101600">
+            <a:solidFill>
+              <a:srgbClr val="0070C0"/>
+            </a:solidFill>
+          </a:ln>
+        </p:spPr>
+        <p:style>
+          <a:lnRef idx="1">
+            <a:schemeClr val="accent1"/>
+          </a:lnRef>
+          <a:fillRef idx="0">
+            <a:schemeClr val="accent1"/>
+          </a:fillRef>
+          <a:effectRef idx="0">
+            <a:schemeClr val="accent1"/>
+          </a:effectRef>
+          <a:fontRef idx="minor">
+            <a:schemeClr val="tx1"/>
+          </a:fontRef>
+        </p:style>
+      </p:cxnSp>
+      <p:cxnSp>
+        <p:nvCxnSpPr>
+          <p:cNvPr id="52" name="Straight Arrow Connector 51"/>
+          <p:cNvCxnSpPr>
+            <a:cxnSpLocks/>
+          </p:cNvCxnSpPr>
+          <p:nvPr/>
+        </p:nvCxnSpPr>
+        <p:spPr>
+          <a:xfrm>
+            <a:off x="2207802" y="5304775"/>
+            <a:ext cx="584760" cy="0"/>
+          </a:xfrm>
+          <a:prstGeom prst="straightConnector1">
+            <a:avLst/>
+          </a:prstGeom>
+          <a:ln w="101600">
+            <a:solidFill>
+              <a:srgbClr val="0070C0"/>
+            </a:solidFill>
+            <a:tailEnd type="triangle"/>
+          </a:ln>
+        </p:spPr>
+        <p:style>
+          <a:lnRef idx="1">
+            <a:schemeClr val="accent1"/>
+          </a:lnRef>
+          <a:fillRef idx="0">
+            <a:schemeClr val="accent1"/>
+          </a:fillRef>
+          <a:effectRef idx="0">
+            <a:schemeClr val="accent1"/>
+          </a:effectRef>
+          <a:fontRef idx="minor">
+            <a:schemeClr val="tx1"/>
+          </a:fontRef>
+        </p:style>
+      </p:cxnSp>
+      <p:cxnSp>
+        <p:nvCxnSpPr>
+          <p:cNvPr id="53" name="Straight Connector 52"/>
+          <p:cNvCxnSpPr>
+            <a:cxnSpLocks/>
+          </p:cNvCxnSpPr>
+          <p:nvPr/>
+        </p:nvCxnSpPr>
+        <p:spPr>
+          <a:xfrm flipV="1">
+            <a:off x="2203884" y="4809928"/>
+            <a:ext cx="3918" cy="1866514"/>
+          </a:xfrm>
+          <a:prstGeom prst="line">
+            <a:avLst/>
+          </a:prstGeom>
+          <a:ln w="101600">
+            <a:solidFill>
+              <a:srgbClr val="0070C0"/>
+            </a:solidFill>
+          </a:ln>
+        </p:spPr>
+        <p:style>
+          <a:lnRef idx="1">
+            <a:schemeClr val="accent1"/>
+          </a:lnRef>
+          <a:fillRef idx="0">
+            <a:schemeClr val="accent1"/>
+          </a:fillRef>
+          <a:effectRef idx="0">
+            <a:schemeClr val="accent1"/>
+          </a:effectRef>
+          <a:fontRef idx="minor">
+            <a:schemeClr val="tx1"/>
+          </a:fontRef>
+        </p:style>
+      </p:cxnSp>
+      <p:cxnSp>
+        <p:nvCxnSpPr>
+          <p:cNvPr id="54" name="Straight Connector 53"/>
+          <p:cNvCxnSpPr/>
+          <p:nvPr/>
+        </p:nvCxnSpPr>
+        <p:spPr>
+          <a:xfrm flipH="1" flipV="1">
+            <a:off x="1824637" y="4809927"/>
+            <a:ext cx="433563" cy="10092"/>
+          </a:xfrm>
+          <a:prstGeom prst="line">
+            <a:avLst/>
+          </a:prstGeom>
+          <a:ln w="101600">
+            <a:solidFill>
+              <a:srgbClr val="0070C0"/>
+            </a:solidFill>
+          </a:ln>
+        </p:spPr>
+        <p:style>
+          <a:lnRef idx="1">
+            <a:schemeClr val="accent1"/>
+          </a:lnRef>
+          <a:fillRef idx="0">
+            <a:schemeClr val="accent1"/>
+          </a:fillRef>
+          <a:effectRef idx="0">
+            <a:schemeClr val="accent1"/>
+          </a:effectRef>
+          <a:fontRef idx="minor">
+            <a:schemeClr val="tx1"/>
+          </a:fontRef>
+        </p:style>
+      </p:cxnSp>
+      <p:cxnSp>
+        <p:nvCxnSpPr>
+          <p:cNvPr id="55" name="Straight Connector 54"/>
+          <p:cNvCxnSpPr>
+            <a:cxnSpLocks/>
+          </p:cNvCxnSpPr>
+          <p:nvPr/>
+        </p:nvCxnSpPr>
+        <p:spPr>
+          <a:xfrm flipH="1">
+            <a:off x="1795088" y="6676442"/>
+            <a:ext cx="452438" cy="0"/>
+          </a:xfrm>
+          <a:prstGeom prst="line">
+            <a:avLst/>
+          </a:prstGeom>
+          <a:ln w="101600">
+            <a:solidFill>
+              <a:srgbClr val="0070C0"/>
+            </a:solidFill>
+          </a:ln>
+        </p:spPr>
+        <p:style>
+          <a:lnRef idx="1">
+            <a:schemeClr val="accent1"/>
+          </a:lnRef>
+          <a:fillRef idx="0">
+            <a:schemeClr val="accent1"/>
+          </a:fillRef>
+          <a:effectRef idx="0">
+            <a:schemeClr val="accent1"/>
+          </a:effectRef>
+          <a:fontRef idx="minor">
+            <a:schemeClr val="tx1"/>
+          </a:fontRef>
+        </p:style>
+      </p:cxnSp>
+      <p:sp>
+        <p:nvSpPr>
+          <p:cNvPr id="57" name="TextBox 56"/>
+          <p:cNvSpPr txBox="1"/>
+          <p:nvPr/>
+        </p:nvSpPr>
+        <p:spPr>
+          <a:xfrm>
+            <a:off x="10307310" y="2967881"/>
+            <a:ext cx="2058302" cy="830997"/>
+          </a:xfrm>
+          <a:prstGeom prst="rect">
+            <a:avLst/>
+          </a:prstGeom>
+          <a:noFill/>
+        </p:spPr>
+        <p:txBody>
+          <a:bodyPr wrap="square" rtlCol="0">
+            <a:spAutoFit/>
+          </a:bodyPr>
+          <a:lstStyle/>
+          <a:p>
+            <a:pPr algn="ctr"/>
+            <a:r>
+              <a:rPr lang="en-US" sz="2400" dirty="0"/>
+              <a:t>Predictive</a:t>
+            </a:r>
+          </a:p>
+          <a:p>
+            <a:pPr algn="ctr"/>
+            <a:r>
+              <a:rPr lang="en-US" sz="2400" dirty="0"/>
+              <a:t>apps</a:t>
+            </a:r>
+          </a:p>
+        </p:txBody>
+      </p:sp>
+      <p:sp>
+        <p:nvSpPr>
+          <p:cNvPr id="58" name="TextBox 57"/>
+          <p:cNvSpPr txBox="1"/>
+          <p:nvPr/>
+        </p:nvSpPr>
+        <p:spPr>
+          <a:xfrm>
+            <a:off x="10307310" y="4894895"/>
+            <a:ext cx="2058302" cy="461665"/>
+          </a:xfrm>
+          <a:prstGeom prst="rect">
+            <a:avLst/>
+          </a:prstGeom>
+          <a:noFill/>
+        </p:spPr>
+        <p:txBody>
+          <a:bodyPr wrap="square" rtlCol="0">
+            <a:spAutoFit/>
+          </a:bodyPr>
+          <a:lstStyle/>
+          <a:p>
+            <a:pPr algn="ctr"/>
+            <a:r>
+              <a:rPr lang="en-US" sz="2400" dirty="0"/>
+              <a:t>BI tools</a:t>
+            </a:r>
+          </a:p>
+        </p:txBody>
+      </p:sp>
+      <p:pic>
+        <p:nvPicPr>
+          <p:cNvPr id="59" name="Picture 58"/>
+          <p:cNvPicPr>
+            <a:picLocks noChangeAspect="1"/>
+          </p:cNvPicPr>
+          <p:nvPr/>
+        </p:nvPicPr>
+        <p:blipFill>
+          <a:blip r:embed="rId10">
+            <a:biLevel thresh="75000"/>
+            <a:extLst>
+              <a:ext uri="{28A0092B-C50C-407E-A947-70E740481C1C}">
+                <a14:useLocalDpi xmlns:a14="http://schemas.microsoft.com/office/drawing/2010/main" val="0"/>
+              </a:ext>
+            </a:extLst>
+          </a:blip>
+          <a:stretch>
+            <a:fillRect/>
+          </a:stretch>
+        </p:blipFill>
+        <p:spPr>
+          <a:xfrm>
+            <a:off x="11068835" y="4371299"/>
+            <a:ext cx="535251" cy="535251"/>
+          </a:xfrm>
+          <a:prstGeom prst="rect">
+            <a:avLst/>
+          </a:prstGeom>
+        </p:spPr>
+      </p:pic>
+      <p:pic>
+        <p:nvPicPr>
+          <p:cNvPr id="60" name="Picture 59"/>
+          <p:cNvPicPr>
+            <a:picLocks noChangeAspect="1"/>
+          </p:cNvPicPr>
+          <p:nvPr/>
+        </p:nvPicPr>
+        <p:blipFill>
+          <a:blip r:embed="rId11">
+            <a:biLevel thresh="75000"/>
+            <a:extLst>
+              <a:ext uri="{28A0092B-C50C-407E-A947-70E740481C1C}">
+                <a14:useLocalDpi xmlns:a14="http://schemas.microsoft.com/office/drawing/2010/main" val="0"/>
+              </a:ext>
+            </a:extLst>
+          </a:blip>
+          <a:stretch>
+            <a:fillRect/>
+          </a:stretch>
+        </p:blipFill>
+        <p:spPr>
+          <a:xfrm>
+            <a:off x="11060526" y="2517871"/>
+            <a:ext cx="543560" cy="543560"/>
+          </a:xfrm>
+          <a:prstGeom prst="rect">
+            <a:avLst/>
+          </a:prstGeom>
+        </p:spPr>
+      </p:pic>
+      <p:pic>
+        <p:nvPicPr>
+          <p:cNvPr id="4" name="Graphic 3">
+            <a:extLst>
+              <a:ext uri="{FF2B5EF4-FFF2-40B4-BE49-F238E27FC236}">
+                <a16:creationId xmlns:a16="http://schemas.microsoft.com/office/drawing/2014/main" id="{84668113-1C44-464D-AEAE-4A45B5B0FFE3}"/>
+              </a:ext>
+            </a:extLst>
+          </p:cNvPr>
+          <p:cNvPicPr>
+            <a:picLocks noChangeAspect="1"/>
+          </p:cNvPicPr>
+          <p:nvPr/>
+        </p:nvPicPr>
+        <p:blipFill>
+          <a:blip r:embed="rId12">
+            <a:extLst>
+              <a:ext uri="{96DAC541-7B7A-43D3-8B79-37D633B846F1}">
+                <asvg:svgBlip xmlns:asvg="http://schemas.microsoft.com/office/drawing/2016/SVG/main" r:embed="rId13"/>
+              </a:ext>
+            </a:extLst>
+          </a:blip>
+          <a:stretch>
+            <a:fillRect/>
+          </a:stretch>
+        </p:blipFill>
+        <p:spPr>
+          <a:xfrm>
+            <a:off x="3220045" y="4478460"/>
+            <a:ext cx="476250" cy="476250"/>
+          </a:xfrm>
+          <a:prstGeom prst="rect">
+            <a:avLst/>
+          </a:prstGeom>
+        </p:spPr>
+      </p:pic>
+      <p:sp>
+        <p:nvSpPr>
+          <p:cNvPr id="56" name="TextBox 55">
+            <a:extLst>
+              <a:ext uri="{FF2B5EF4-FFF2-40B4-BE49-F238E27FC236}">
+                <a16:creationId xmlns:a16="http://schemas.microsoft.com/office/drawing/2014/main" id="{BFE16701-7683-4D0F-B56A-CCA242B230CC}"/>
+              </a:ext>
+            </a:extLst>
+          </p:cNvPr>
+          <p:cNvSpPr txBox="1"/>
+          <p:nvPr/>
+        </p:nvSpPr>
+        <p:spPr>
+          <a:xfrm>
+            <a:off x="2619051" y="4946469"/>
+            <a:ext cx="1757423" cy="923330"/>
+          </a:xfrm>
+          <a:prstGeom prst="rect">
+            <a:avLst/>
+          </a:prstGeom>
+          <a:noFill/>
+        </p:spPr>
+        <p:txBody>
+          <a:bodyPr wrap="square" rtlCol="0">
+            <a:spAutoFit/>
+          </a:bodyPr>
+          <a:lstStyle/>
+          <a:p>
+            <a:pPr algn="ctr"/>
+            <a:r>
+              <a:rPr lang="en-US" dirty="0"/>
+              <a:t>Scheduled data movement orchestration</a:t>
+            </a:r>
+          </a:p>
+        </p:txBody>
+      </p:sp>
+      <p:sp>
+        <p:nvSpPr>
+          <p:cNvPr id="3" name="TextBox 2">
+            <a:extLst>
+              <a:ext uri="{FF2B5EF4-FFF2-40B4-BE49-F238E27FC236}">
+                <a16:creationId xmlns:a16="http://schemas.microsoft.com/office/drawing/2014/main" id="{1992EA4B-2C4A-47E9-9CBC-BEFAE0172812}"/>
+              </a:ext>
+            </a:extLst>
+          </p:cNvPr>
+          <p:cNvSpPr txBox="1"/>
+          <p:nvPr/>
+        </p:nvSpPr>
+        <p:spPr>
+          <a:xfrm>
+            <a:off x="476828" y="42007"/>
+            <a:ext cx="5799601" cy="584775"/>
+          </a:xfrm>
+          <a:prstGeom prst="rect">
+            <a:avLst/>
+          </a:prstGeom>
+          <a:noFill/>
+        </p:spPr>
+        <p:txBody>
+          <a:bodyPr wrap="none" rtlCol="0">
+            <a:spAutoFit/>
+          </a:bodyPr>
+          <a:lstStyle/>
+          <a:p>
+            <a:r>
+              <a:rPr lang="en-US" sz="3200" dirty="0">
+                <a:latin typeface="+mj-lt"/>
+              </a:rPr>
+              <a:t>Infographic for common scenarios</a:t>
+            </a:r>
+          </a:p>
+        </p:txBody>
+      </p:sp>
+      <p:sp>
+        <p:nvSpPr>
+          <p:cNvPr id="61" name="TextBox 60">
+            <a:extLst>
+              <a:ext uri="{FF2B5EF4-FFF2-40B4-BE49-F238E27FC236}">
+                <a16:creationId xmlns:a16="http://schemas.microsoft.com/office/drawing/2014/main" id="{A6633C8F-DF5C-4C3A-BFC6-51A792F0D8E2}"/>
+              </a:ext>
+            </a:extLst>
+          </p:cNvPr>
+          <p:cNvSpPr txBox="1"/>
+          <p:nvPr/>
+        </p:nvSpPr>
+        <p:spPr>
+          <a:xfrm>
+            <a:off x="6749236" y="2892367"/>
+            <a:ext cx="1628148" cy="2616101"/>
+          </a:xfrm>
+          <a:prstGeom prst="rect">
+            <a:avLst/>
+          </a:prstGeom>
+          <a:noFill/>
+        </p:spPr>
+        <p:txBody>
+          <a:bodyPr wrap="square" rtlCol="0">
+            <a:spAutoFit/>
+          </a:bodyPr>
+          <a:lstStyle/>
+          <a:p>
+            <a:pPr algn="ctr"/>
+            <a:r>
+              <a:rPr lang="en-US" sz="2000" dirty="0"/>
+              <a:t>Machine learning services and libraries</a:t>
+            </a:r>
+            <a:br>
+              <a:rPr lang="en-US" sz="2000" dirty="0"/>
+            </a:br>
+            <a:br>
+              <a:rPr lang="en-US" sz="2000" dirty="0"/>
+            </a:br>
+            <a:r>
+              <a:rPr lang="en-US" sz="1600" dirty="0"/>
+              <a:t>(Python, Scala, Java, R, Spark, Hadoop, SQL ML Services)</a:t>
+            </a:r>
+          </a:p>
+        </p:txBody>
+      </p:sp>
+      <p:sp>
+        <p:nvSpPr>
+          <p:cNvPr id="62" name="TextBox 61">
+            <a:extLst>
+              <a:ext uri="{FF2B5EF4-FFF2-40B4-BE49-F238E27FC236}">
+                <a16:creationId xmlns:a16="http://schemas.microsoft.com/office/drawing/2014/main" id="{8BC33E6D-E5A7-4830-8434-195F64C5BF14}"/>
+              </a:ext>
+            </a:extLst>
+          </p:cNvPr>
+          <p:cNvSpPr txBox="1"/>
+          <p:nvPr/>
+        </p:nvSpPr>
+        <p:spPr>
+          <a:xfrm>
+            <a:off x="8823034" y="3240766"/>
+            <a:ext cx="1628148" cy="1815882"/>
+          </a:xfrm>
+          <a:prstGeom prst="rect">
+            <a:avLst/>
+          </a:prstGeom>
+          <a:noFill/>
+        </p:spPr>
+        <p:txBody>
+          <a:bodyPr wrap="square" rtlCol="0">
+            <a:spAutoFit/>
+          </a:bodyPr>
+          <a:lstStyle/>
+          <a:p>
+            <a:pPr algn="ctr"/>
+            <a:r>
+              <a:rPr lang="en-US" sz="1600" dirty="0"/>
+              <a:t>Operationalized model served by ML service hosted in container, web service, or database service</a:t>
+            </a:r>
+          </a:p>
+        </p:txBody>
+      </p:sp>
+      <p:sp>
+        <p:nvSpPr>
+          <p:cNvPr id="63" name="TextBox 62">
+            <a:extLst>
+              <a:ext uri="{FF2B5EF4-FFF2-40B4-BE49-F238E27FC236}">
+                <a16:creationId xmlns:a16="http://schemas.microsoft.com/office/drawing/2014/main" id="{5FDA957E-92E4-4ADC-9690-0CD76CD8B3DA}"/>
+              </a:ext>
+            </a:extLst>
+          </p:cNvPr>
+          <p:cNvSpPr txBox="1"/>
+          <p:nvPr/>
+        </p:nvSpPr>
+        <p:spPr>
+          <a:xfrm>
+            <a:off x="4683525" y="5454736"/>
+            <a:ext cx="1628148" cy="430887"/>
+          </a:xfrm>
+          <a:prstGeom prst="rect">
+            <a:avLst/>
+          </a:prstGeom>
+          <a:noFill/>
+        </p:spPr>
+        <p:txBody>
+          <a:bodyPr wrap="square" rtlCol="0">
+            <a:spAutoFit/>
+          </a:bodyPr>
+          <a:lstStyle/>
+          <a:p>
+            <a:pPr algn="ctr"/>
+            <a:r>
+              <a:rPr lang="en-US" sz="1100" dirty="0"/>
+              <a:t>Access through PolyBase or Apache Spark</a:t>
+            </a:r>
+          </a:p>
+        </p:txBody>
+      </p:sp>
+    </p:spTree>
+    <p:extLst>
+      <p:ext uri="{BB962C8B-B14F-4D97-AF65-F5344CB8AC3E}">
+        <p14:creationId xmlns:p14="http://schemas.microsoft.com/office/powerpoint/2010/main" val="300566555"/>
+      </p:ext>
+    </p:extLst>
+  </p:cSld>
+  <p:clrMapOvr>
+    <a:masterClrMapping/>
+  </p:clrMapOvr>
+</p:sld>
+</file>
+
 <file path=ppt/theme/theme1.xml><?xml version="1.0" encoding="utf-8"?>
 <a:theme xmlns:a="http://schemas.openxmlformats.org/drawingml/2006/main" name="Office Theme">
   <a:themeElements>

</xml_diff>